<commit_message>
Gegegnwertigen Zustand der PowerPoint Präsentation in den Meilenstein Ordner hinzugefügt
</commit_message>
<xml_diff>
--- a/documents/Meilensteine/Meilenstein I/mockup.pptx
+++ b/documents/Meilensteine/Meilenstein I/mockup.pptx
@@ -160,7 +160,7 @@
           </a:lstStyle>
           <a:p>
             <a:r>
-              <a:rPr lang="de-DE" smtClean="0"/>
+              <a:rPr lang="de-DE"/>
               <a:t>Mastertitelformat bearbeiten</a:t>
             </a:r>
             <a:endParaRPr lang="de-CH"/>
@@ -225,7 +225,7 @@
           </a:lstStyle>
           <a:p>
             <a:r>
-              <a:rPr lang="de-DE" smtClean="0"/>
+              <a:rPr lang="de-DE"/>
               <a:t>Master-Untertitelformat bearbeiten</a:t>
             </a:r>
             <a:endParaRPr lang="de-CH"/>
@@ -249,7 +249,7 @@
           <a:p>
             <a:fld id="{FCC6E637-CEF3-B043-8F54-4D85C1880CDC}" type="datetimeFigureOut">
               <a:rPr lang="de-CH" smtClean="0"/>
-              <a:t>27.02.20</a:t>
+              <a:t>28.02.20</a:t>
             </a:fld>
             <a:endParaRPr lang="de-CH"/>
           </a:p>
@@ -343,7 +343,7 @@
           <a:lstStyle/>
           <a:p>
             <a:r>
-              <a:rPr lang="de-DE" smtClean="0"/>
+              <a:rPr lang="de-DE"/>
               <a:t>Mastertitelformat bearbeiten</a:t>
             </a:r>
             <a:endParaRPr lang="de-CH"/>
@@ -367,35 +367,35 @@
           <a:p>
             <a:pPr lvl="0"/>
             <a:r>
-              <a:rPr lang="de-DE" smtClean="0"/>
+              <a:rPr lang="de-DE"/>
               <a:t>Mastertextformat bearbeiten</a:t>
             </a:r>
           </a:p>
           <a:p>
             <a:pPr lvl="1"/>
             <a:r>
-              <a:rPr lang="de-DE" smtClean="0"/>
+              <a:rPr lang="de-DE"/>
               <a:t>Zweite Ebene</a:t>
             </a:r>
           </a:p>
           <a:p>
             <a:pPr lvl="2"/>
             <a:r>
-              <a:rPr lang="de-DE" smtClean="0"/>
+              <a:rPr lang="de-DE"/>
               <a:t>Dritte Ebene</a:t>
             </a:r>
           </a:p>
           <a:p>
             <a:pPr lvl="3"/>
             <a:r>
-              <a:rPr lang="de-DE" smtClean="0"/>
+              <a:rPr lang="de-DE"/>
               <a:t>Vierte Ebene</a:t>
             </a:r>
           </a:p>
           <a:p>
             <a:pPr lvl="4"/>
             <a:r>
-              <a:rPr lang="de-DE" smtClean="0"/>
+              <a:rPr lang="de-DE"/>
               <a:t>Fünfte Ebene</a:t>
             </a:r>
             <a:endParaRPr lang="de-CH"/>
@@ -419,7 +419,7 @@
           <a:p>
             <a:fld id="{FCC6E637-CEF3-B043-8F54-4D85C1880CDC}" type="datetimeFigureOut">
               <a:rPr lang="de-CH" smtClean="0"/>
-              <a:t>27.02.20</a:t>
+              <a:t>28.02.20</a:t>
             </a:fld>
             <a:endParaRPr lang="de-CH"/>
           </a:p>
@@ -518,7 +518,7 @@
           <a:lstStyle/>
           <a:p>
             <a:r>
-              <a:rPr lang="de-DE" smtClean="0"/>
+              <a:rPr lang="de-DE"/>
               <a:t>Mastertitelformat bearbeiten</a:t>
             </a:r>
             <a:endParaRPr lang="de-CH"/>
@@ -547,35 +547,35 @@
           <a:p>
             <a:pPr lvl="0"/>
             <a:r>
-              <a:rPr lang="de-DE" smtClean="0"/>
+              <a:rPr lang="de-DE"/>
               <a:t>Mastertextformat bearbeiten</a:t>
             </a:r>
           </a:p>
           <a:p>
             <a:pPr lvl="1"/>
             <a:r>
-              <a:rPr lang="de-DE" smtClean="0"/>
+              <a:rPr lang="de-DE"/>
               <a:t>Zweite Ebene</a:t>
             </a:r>
           </a:p>
           <a:p>
             <a:pPr lvl="2"/>
             <a:r>
-              <a:rPr lang="de-DE" smtClean="0"/>
+              <a:rPr lang="de-DE"/>
               <a:t>Dritte Ebene</a:t>
             </a:r>
           </a:p>
           <a:p>
             <a:pPr lvl="3"/>
             <a:r>
-              <a:rPr lang="de-DE" smtClean="0"/>
+              <a:rPr lang="de-DE"/>
               <a:t>Vierte Ebene</a:t>
             </a:r>
           </a:p>
           <a:p>
             <a:pPr lvl="4"/>
             <a:r>
-              <a:rPr lang="de-DE" smtClean="0"/>
+              <a:rPr lang="de-DE"/>
               <a:t>Fünfte Ebene</a:t>
             </a:r>
             <a:endParaRPr lang="de-CH"/>
@@ -599,7 +599,7 @@
           <a:p>
             <a:fld id="{FCC6E637-CEF3-B043-8F54-4D85C1880CDC}" type="datetimeFigureOut">
               <a:rPr lang="de-CH" smtClean="0"/>
-              <a:t>27.02.20</a:t>
+              <a:t>28.02.20</a:t>
             </a:fld>
             <a:endParaRPr lang="de-CH"/>
           </a:p>
@@ -693,7 +693,7 @@
           <a:lstStyle/>
           <a:p>
             <a:r>
-              <a:rPr lang="de-DE" smtClean="0"/>
+              <a:rPr lang="de-DE"/>
               <a:t>Mastertitelformat bearbeiten</a:t>
             </a:r>
             <a:endParaRPr lang="de-CH"/>
@@ -717,35 +717,35 @@
           <a:p>
             <a:pPr lvl="0"/>
             <a:r>
-              <a:rPr lang="de-DE" smtClean="0"/>
+              <a:rPr lang="de-DE"/>
               <a:t>Mastertextformat bearbeiten</a:t>
             </a:r>
           </a:p>
           <a:p>
             <a:pPr lvl="1"/>
             <a:r>
-              <a:rPr lang="de-DE" smtClean="0"/>
+              <a:rPr lang="de-DE"/>
               <a:t>Zweite Ebene</a:t>
             </a:r>
           </a:p>
           <a:p>
             <a:pPr lvl="2"/>
             <a:r>
-              <a:rPr lang="de-DE" smtClean="0"/>
+              <a:rPr lang="de-DE"/>
               <a:t>Dritte Ebene</a:t>
             </a:r>
           </a:p>
           <a:p>
             <a:pPr lvl="3"/>
             <a:r>
-              <a:rPr lang="de-DE" smtClean="0"/>
+              <a:rPr lang="de-DE"/>
               <a:t>Vierte Ebene</a:t>
             </a:r>
           </a:p>
           <a:p>
             <a:pPr lvl="4"/>
             <a:r>
-              <a:rPr lang="de-DE" smtClean="0"/>
+              <a:rPr lang="de-DE"/>
               <a:t>Fünfte Ebene</a:t>
             </a:r>
             <a:endParaRPr lang="de-CH"/>
@@ -769,7 +769,7 @@
           <a:p>
             <a:fld id="{FCC6E637-CEF3-B043-8F54-4D85C1880CDC}" type="datetimeFigureOut">
               <a:rPr lang="de-CH" smtClean="0"/>
-              <a:t>27.02.20</a:t>
+              <a:t>28.02.20</a:t>
             </a:fld>
             <a:endParaRPr lang="de-CH"/>
           </a:p>
@@ -872,7 +872,7 @@
           </a:lstStyle>
           <a:p>
             <a:r>
-              <a:rPr lang="de-DE" smtClean="0"/>
+              <a:rPr lang="de-DE"/>
               <a:t>Mastertitelformat bearbeiten</a:t>
             </a:r>
             <a:endParaRPr lang="de-CH"/>
@@ -992,7 +992,7 @@
           <a:p>
             <a:pPr lvl="0"/>
             <a:r>
-              <a:rPr lang="de-DE" smtClean="0"/>
+              <a:rPr lang="de-DE"/>
               <a:t>Mastertextformat bearbeiten</a:t>
             </a:r>
           </a:p>
@@ -1015,7 +1015,7 @@
           <a:p>
             <a:fld id="{FCC6E637-CEF3-B043-8F54-4D85C1880CDC}" type="datetimeFigureOut">
               <a:rPr lang="de-CH" smtClean="0"/>
-              <a:t>27.02.20</a:t>
+              <a:t>28.02.20</a:t>
             </a:fld>
             <a:endParaRPr lang="de-CH"/>
           </a:p>
@@ -1109,7 +1109,7 @@
           <a:lstStyle/>
           <a:p>
             <a:r>
-              <a:rPr lang="de-DE" smtClean="0"/>
+              <a:rPr lang="de-DE"/>
               <a:t>Mastertitelformat bearbeiten</a:t>
             </a:r>
             <a:endParaRPr lang="de-CH"/>
@@ -1138,35 +1138,35 @@
           <a:p>
             <a:pPr lvl="0"/>
             <a:r>
-              <a:rPr lang="de-DE" smtClean="0"/>
+              <a:rPr lang="de-DE"/>
               <a:t>Mastertextformat bearbeiten</a:t>
             </a:r>
           </a:p>
           <a:p>
             <a:pPr lvl="1"/>
             <a:r>
-              <a:rPr lang="de-DE" smtClean="0"/>
+              <a:rPr lang="de-DE"/>
               <a:t>Zweite Ebene</a:t>
             </a:r>
           </a:p>
           <a:p>
             <a:pPr lvl="2"/>
             <a:r>
-              <a:rPr lang="de-DE" smtClean="0"/>
+              <a:rPr lang="de-DE"/>
               <a:t>Dritte Ebene</a:t>
             </a:r>
           </a:p>
           <a:p>
             <a:pPr lvl="3"/>
             <a:r>
-              <a:rPr lang="de-DE" smtClean="0"/>
+              <a:rPr lang="de-DE"/>
               <a:t>Vierte Ebene</a:t>
             </a:r>
           </a:p>
           <a:p>
             <a:pPr lvl="4"/>
             <a:r>
-              <a:rPr lang="de-DE" smtClean="0"/>
+              <a:rPr lang="de-DE"/>
               <a:t>Fünfte Ebene</a:t>
             </a:r>
             <a:endParaRPr lang="de-CH"/>
@@ -1195,35 +1195,35 @@
           <a:p>
             <a:pPr lvl="0"/>
             <a:r>
-              <a:rPr lang="de-DE" smtClean="0"/>
+              <a:rPr lang="de-DE"/>
               <a:t>Mastertextformat bearbeiten</a:t>
             </a:r>
           </a:p>
           <a:p>
             <a:pPr lvl="1"/>
             <a:r>
-              <a:rPr lang="de-DE" smtClean="0"/>
+              <a:rPr lang="de-DE"/>
               <a:t>Zweite Ebene</a:t>
             </a:r>
           </a:p>
           <a:p>
             <a:pPr lvl="2"/>
             <a:r>
-              <a:rPr lang="de-DE" smtClean="0"/>
+              <a:rPr lang="de-DE"/>
               <a:t>Dritte Ebene</a:t>
             </a:r>
           </a:p>
           <a:p>
             <a:pPr lvl="3"/>
             <a:r>
-              <a:rPr lang="de-DE" smtClean="0"/>
+              <a:rPr lang="de-DE"/>
               <a:t>Vierte Ebene</a:t>
             </a:r>
           </a:p>
           <a:p>
             <a:pPr lvl="4"/>
             <a:r>
-              <a:rPr lang="de-DE" smtClean="0"/>
+              <a:rPr lang="de-DE"/>
               <a:t>Fünfte Ebene</a:t>
             </a:r>
             <a:endParaRPr lang="de-CH"/>
@@ -1247,7 +1247,7 @@
           <a:p>
             <a:fld id="{FCC6E637-CEF3-B043-8F54-4D85C1880CDC}" type="datetimeFigureOut">
               <a:rPr lang="de-CH" smtClean="0"/>
-              <a:t>27.02.20</a:t>
+              <a:t>28.02.20</a:t>
             </a:fld>
             <a:endParaRPr lang="de-CH"/>
           </a:p>
@@ -1346,7 +1346,7 @@
           <a:lstStyle/>
           <a:p>
             <a:r>
-              <a:rPr lang="de-DE" smtClean="0"/>
+              <a:rPr lang="de-DE"/>
               <a:t>Mastertitelformat bearbeiten</a:t>
             </a:r>
             <a:endParaRPr lang="de-CH"/>
@@ -1412,7 +1412,7 @@
           <a:p>
             <a:pPr lvl="0"/>
             <a:r>
-              <a:rPr lang="de-DE" smtClean="0"/>
+              <a:rPr lang="de-DE"/>
               <a:t>Mastertextformat bearbeiten</a:t>
             </a:r>
           </a:p>
@@ -1440,35 +1440,35 @@
           <a:p>
             <a:pPr lvl="0"/>
             <a:r>
-              <a:rPr lang="de-DE" smtClean="0"/>
+              <a:rPr lang="de-DE"/>
               <a:t>Mastertextformat bearbeiten</a:t>
             </a:r>
           </a:p>
           <a:p>
             <a:pPr lvl="1"/>
             <a:r>
-              <a:rPr lang="de-DE" smtClean="0"/>
+              <a:rPr lang="de-DE"/>
               <a:t>Zweite Ebene</a:t>
             </a:r>
           </a:p>
           <a:p>
             <a:pPr lvl="2"/>
             <a:r>
-              <a:rPr lang="de-DE" smtClean="0"/>
+              <a:rPr lang="de-DE"/>
               <a:t>Dritte Ebene</a:t>
             </a:r>
           </a:p>
           <a:p>
             <a:pPr lvl="3"/>
             <a:r>
-              <a:rPr lang="de-DE" smtClean="0"/>
+              <a:rPr lang="de-DE"/>
               <a:t>Vierte Ebene</a:t>
             </a:r>
           </a:p>
           <a:p>
             <a:pPr lvl="4"/>
             <a:r>
-              <a:rPr lang="de-DE" smtClean="0"/>
+              <a:rPr lang="de-DE"/>
               <a:t>Fünfte Ebene</a:t>
             </a:r>
             <a:endParaRPr lang="de-CH"/>
@@ -1534,7 +1534,7 @@
           <a:p>
             <a:pPr lvl="0"/>
             <a:r>
-              <a:rPr lang="de-DE" smtClean="0"/>
+              <a:rPr lang="de-DE"/>
               <a:t>Mastertextformat bearbeiten</a:t>
             </a:r>
           </a:p>
@@ -1562,35 +1562,35 @@
           <a:p>
             <a:pPr lvl="0"/>
             <a:r>
-              <a:rPr lang="de-DE" smtClean="0"/>
+              <a:rPr lang="de-DE"/>
               <a:t>Mastertextformat bearbeiten</a:t>
             </a:r>
           </a:p>
           <a:p>
             <a:pPr lvl="1"/>
             <a:r>
-              <a:rPr lang="de-DE" smtClean="0"/>
+              <a:rPr lang="de-DE"/>
               <a:t>Zweite Ebene</a:t>
             </a:r>
           </a:p>
           <a:p>
             <a:pPr lvl="2"/>
             <a:r>
-              <a:rPr lang="de-DE" smtClean="0"/>
+              <a:rPr lang="de-DE"/>
               <a:t>Dritte Ebene</a:t>
             </a:r>
           </a:p>
           <a:p>
             <a:pPr lvl="3"/>
             <a:r>
-              <a:rPr lang="de-DE" smtClean="0"/>
+              <a:rPr lang="de-DE"/>
               <a:t>Vierte Ebene</a:t>
             </a:r>
           </a:p>
           <a:p>
             <a:pPr lvl="4"/>
             <a:r>
-              <a:rPr lang="de-DE" smtClean="0"/>
+              <a:rPr lang="de-DE"/>
               <a:t>Fünfte Ebene</a:t>
             </a:r>
             <a:endParaRPr lang="de-CH"/>
@@ -1614,7 +1614,7 @@
           <a:p>
             <a:fld id="{FCC6E637-CEF3-B043-8F54-4D85C1880CDC}" type="datetimeFigureOut">
               <a:rPr lang="de-CH" smtClean="0"/>
-              <a:t>27.02.20</a:t>
+              <a:t>28.02.20</a:t>
             </a:fld>
             <a:endParaRPr lang="de-CH"/>
           </a:p>
@@ -1708,7 +1708,7 @@
           <a:lstStyle/>
           <a:p>
             <a:r>
-              <a:rPr lang="de-DE" smtClean="0"/>
+              <a:rPr lang="de-DE"/>
               <a:t>Mastertitelformat bearbeiten</a:t>
             </a:r>
             <a:endParaRPr lang="de-CH"/>
@@ -1732,7 +1732,7 @@
           <a:p>
             <a:fld id="{FCC6E637-CEF3-B043-8F54-4D85C1880CDC}" type="datetimeFigureOut">
               <a:rPr lang="de-CH" smtClean="0"/>
-              <a:t>27.02.20</a:t>
+              <a:t>28.02.20</a:t>
             </a:fld>
             <a:endParaRPr lang="de-CH"/>
           </a:p>
@@ -1827,7 +1827,7 @@
           <a:p>
             <a:fld id="{FCC6E637-CEF3-B043-8F54-4D85C1880CDC}" type="datetimeFigureOut">
               <a:rPr lang="de-CH" smtClean="0"/>
-              <a:t>27.02.20</a:t>
+              <a:t>28.02.20</a:t>
             </a:fld>
             <a:endParaRPr lang="de-CH"/>
           </a:p>
@@ -1930,7 +1930,7 @@
           </a:lstStyle>
           <a:p>
             <a:r>
-              <a:rPr lang="de-DE" smtClean="0"/>
+              <a:rPr lang="de-DE"/>
               <a:t>Mastertitelformat bearbeiten</a:t>
             </a:r>
             <a:endParaRPr lang="de-CH"/>
@@ -1987,35 +1987,35 @@
           <a:p>
             <a:pPr lvl="0"/>
             <a:r>
-              <a:rPr lang="de-DE" smtClean="0"/>
+              <a:rPr lang="de-DE"/>
               <a:t>Mastertextformat bearbeiten</a:t>
             </a:r>
           </a:p>
           <a:p>
             <a:pPr lvl="1"/>
             <a:r>
-              <a:rPr lang="de-DE" smtClean="0"/>
+              <a:rPr lang="de-DE"/>
               <a:t>Zweite Ebene</a:t>
             </a:r>
           </a:p>
           <a:p>
             <a:pPr lvl="2"/>
             <a:r>
-              <a:rPr lang="de-DE" smtClean="0"/>
+              <a:rPr lang="de-DE"/>
               <a:t>Dritte Ebene</a:t>
             </a:r>
           </a:p>
           <a:p>
             <a:pPr lvl="3"/>
             <a:r>
-              <a:rPr lang="de-DE" smtClean="0"/>
+              <a:rPr lang="de-DE"/>
               <a:t>Vierte Ebene</a:t>
             </a:r>
           </a:p>
           <a:p>
             <a:pPr lvl="4"/>
             <a:r>
-              <a:rPr lang="de-DE" smtClean="0"/>
+              <a:rPr lang="de-DE"/>
               <a:t>Fünfte Ebene</a:t>
             </a:r>
             <a:endParaRPr lang="de-CH"/>
@@ -2081,7 +2081,7 @@
           <a:p>
             <a:pPr lvl="0"/>
             <a:r>
-              <a:rPr lang="de-DE" smtClean="0"/>
+              <a:rPr lang="de-DE"/>
               <a:t>Mastertextformat bearbeiten</a:t>
             </a:r>
           </a:p>
@@ -2104,7 +2104,7 @@
           <a:p>
             <a:fld id="{FCC6E637-CEF3-B043-8F54-4D85C1880CDC}" type="datetimeFigureOut">
               <a:rPr lang="de-CH" smtClean="0"/>
-              <a:t>27.02.20</a:t>
+              <a:t>28.02.20</a:t>
             </a:fld>
             <a:endParaRPr lang="de-CH"/>
           </a:p>
@@ -2207,7 +2207,7 @@
           </a:lstStyle>
           <a:p>
             <a:r>
-              <a:rPr lang="de-DE" smtClean="0"/>
+              <a:rPr lang="de-DE"/>
               <a:t>Mastertitelformat bearbeiten</a:t>
             </a:r>
             <a:endParaRPr lang="de-CH"/>
@@ -2334,7 +2334,7 @@
           <a:p>
             <a:pPr lvl="0"/>
             <a:r>
-              <a:rPr lang="de-DE" smtClean="0"/>
+              <a:rPr lang="de-DE"/>
               <a:t>Mastertextformat bearbeiten</a:t>
             </a:r>
           </a:p>
@@ -2357,7 +2357,7 @@
           <a:p>
             <a:fld id="{FCC6E637-CEF3-B043-8F54-4D85C1880CDC}" type="datetimeFigureOut">
               <a:rPr lang="de-CH" smtClean="0"/>
-              <a:t>27.02.20</a:t>
+              <a:t>28.02.20</a:t>
             </a:fld>
             <a:endParaRPr lang="de-CH"/>
           </a:p>
@@ -2466,7 +2466,7 @@
           <a:lstStyle/>
           <a:p>
             <a:r>
-              <a:rPr lang="de-DE" smtClean="0"/>
+              <a:rPr lang="de-DE"/>
               <a:t>Mastertitelformat bearbeiten</a:t>
             </a:r>
             <a:endParaRPr lang="de-CH"/>
@@ -2500,35 +2500,35 @@
           <a:p>
             <a:pPr lvl="0"/>
             <a:r>
-              <a:rPr lang="de-DE" smtClean="0"/>
+              <a:rPr lang="de-DE"/>
               <a:t>Mastertextformat bearbeiten</a:t>
             </a:r>
           </a:p>
           <a:p>
             <a:pPr lvl="1"/>
             <a:r>
-              <a:rPr lang="de-DE" smtClean="0"/>
+              <a:rPr lang="de-DE"/>
               <a:t>Zweite Ebene</a:t>
             </a:r>
           </a:p>
           <a:p>
             <a:pPr lvl="2"/>
             <a:r>
-              <a:rPr lang="de-DE" smtClean="0"/>
+              <a:rPr lang="de-DE"/>
               <a:t>Dritte Ebene</a:t>
             </a:r>
           </a:p>
           <a:p>
             <a:pPr lvl="3"/>
             <a:r>
-              <a:rPr lang="de-DE" smtClean="0"/>
+              <a:rPr lang="de-DE"/>
               <a:t>Vierte Ebene</a:t>
             </a:r>
           </a:p>
           <a:p>
             <a:pPr lvl="4"/>
             <a:r>
-              <a:rPr lang="de-DE" smtClean="0"/>
+              <a:rPr lang="de-DE"/>
               <a:t>Fünfte Ebene</a:t>
             </a:r>
             <a:endParaRPr lang="de-CH"/>
@@ -2570,7 +2570,7 @@
           <a:p>
             <a:fld id="{FCC6E637-CEF3-B043-8F54-4D85C1880CDC}" type="datetimeFigureOut">
               <a:rPr lang="de-CH" smtClean="0"/>
-              <a:t>27.02.20</a:t>
+              <a:t>28.02.20</a:t>
             </a:fld>
             <a:endParaRPr lang="de-CH"/>
           </a:p>
@@ -3068,7 +3068,7 @@
           <a:p>
             <a:pPr algn="ctr"/>
             <a:r>
-              <a:rPr lang="de-CH" sz="3200" b="1" dirty="0" smtClean="0">
+              <a:rPr lang="de-CH" sz="3200" b="1" dirty="0">
                 <a:solidFill>
                   <a:schemeClr val="tx1"/>
                 </a:solidFill>
@@ -3078,14 +3078,6 @@
               </a:rPr>
               <a:t>Start</a:t>
             </a:r>
-            <a:endParaRPr lang="de-CH" sz="3200" b="1" dirty="0">
-              <a:solidFill>
-                <a:schemeClr val="tx1"/>
-              </a:solidFill>
-              <a:latin typeface="Apple Chancery" charset="0"/>
-              <a:ea typeface="Apple Chancery" charset="0"/>
-              <a:cs typeface="Apple Chancery" charset="0"/>
-            </a:endParaRPr>
           </a:p>
         </p:txBody>
       </p:sp>
@@ -3134,7 +3126,7 @@
           <a:p>
             <a:pPr algn="ctr"/>
             <a:r>
-              <a:rPr lang="de-CH" sz="2000" b="1" dirty="0" smtClean="0">
+              <a:rPr lang="de-CH" sz="2000" b="1" dirty="0">
                 <a:solidFill>
                   <a:schemeClr val="tx1"/>
                 </a:solidFill>
@@ -3200,7 +3192,7 @@
           <a:p>
             <a:pPr algn="ctr"/>
             <a:r>
-              <a:rPr lang="de-CH" sz="2400" b="1" dirty="0" smtClean="0">
+              <a:rPr lang="de-CH" sz="2400" b="1" dirty="0">
                 <a:solidFill>
                   <a:schemeClr val="tx1"/>
                 </a:solidFill>
@@ -3266,7 +3258,7 @@
           <a:p>
             <a:pPr algn="ctr"/>
             <a:r>
-              <a:rPr lang="de-CH" b="1" dirty="0" smtClean="0">
+              <a:rPr lang="de-CH" b="1" dirty="0">
                 <a:solidFill>
                   <a:schemeClr val="tx1"/>
                 </a:solidFill>
@@ -3276,14 +3268,6 @@
               </a:rPr>
               <a:t>Ziel</a:t>
             </a:r>
-            <a:endParaRPr lang="de-CH" b="1" dirty="0">
-              <a:solidFill>
-                <a:schemeClr val="tx1"/>
-              </a:solidFill>
-              <a:latin typeface="Apple Chancery" charset="0"/>
-              <a:ea typeface="Apple Chancery" charset="0"/>
-              <a:cs typeface="Apple Chancery" charset="0"/>
-            </a:endParaRPr>
           </a:p>
         </p:txBody>
       </p:sp>
@@ -3332,7 +3316,7 @@
           <a:p>
             <a:pPr algn="ctr"/>
             <a:r>
-              <a:rPr lang="de-CH" sz="1200" b="1" dirty="0" smtClean="0">
+              <a:rPr lang="de-CH" sz="1200" b="1" dirty="0">
                 <a:solidFill>
                   <a:schemeClr val="tx1"/>
                 </a:solidFill>
@@ -3342,14 +3326,6 @@
               </a:rPr>
               <a:t>Einstellungen</a:t>
             </a:r>
-            <a:endParaRPr lang="de-CH" sz="1200" b="1" dirty="0">
-              <a:solidFill>
-                <a:schemeClr val="tx1"/>
-              </a:solidFill>
-              <a:latin typeface="Apple Chancery" charset="0"/>
-              <a:ea typeface="Apple Chancery" charset="0"/>
-              <a:cs typeface="Apple Chancery" charset="0"/>
-            </a:endParaRPr>
           </a:p>
         </p:txBody>
       </p:sp>
@@ -3602,7 +3578,7 @@
           <a:p>
             <a:pPr algn="ctr"/>
             <a:r>
-              <a:rPr lang="de-CH" sz="3200" b="1" dirty="0" smtClean="0">
+              <a:rPr lang="de-CH" sz="3200" b="1" dirty="0">
                 <a:solidFill>
                   <a:schemeClr val="tx1"/>
                 </a:solidFill>
@@ -3612,14 +3588,6 @@
               </a:rPr>
               <a:t>Start</a:t>
             </a:r>
-            <a:endParaRPr lang="de-CH" sz="3200" b="1" dirty="0">
-              <a:solidFill>
-                <a:schemeClr val="tx1"/>
-              </a:solidFill>
-              <a:latin typeface="Apple Chancery" charset="0"/>
-              <a:ea typeface="Apple Chancery" charset="0"/>
-              <a:cs typeface="Apple Chancery" charset="0"/>
-            </a:endParaRPr>
           </a:p>
         </p:txBody>
       </p:sp>
@@ -3668,7 +3636,7 @@
           <a:p>
             <a:pPr algn="ctr"/>
             <a:r>
-              <a:rPr lang="de-CH" sz="2000" b="1" dirty="0" smtClean="0">
+              <a:rPr lang="de-CH" sz="2000" b="1" dirty="0">
                 <a:solidFill>
                   <a:schemeClr val="tx1"/>
                 </a:solidFill>
@@ -3734,7 +3702,7 @@
           <a:p>
             <a:pPr algn="ctr"/>
             <a:r>
-              <a:rPr lang="de-CH" sz="2400" b="1" dirty="0" smtClean="0">
+              <a:rPr lang="de-CH" sz="2400" b="1" dirty="0">
                 <a:solidFill>
                   <a:schemeClr val="tx1"/>
                 </a:solidFill>
@@ -3800,7 +3768,7 @@
           <a:p>
             <a:pPr algn="ctr"/>
             <a:r>
-              <a:rPr lang="de-CH" b="1" dirty="0" smtClean="0">
+              <a:rPr lang="de-CH" b="1" dirty="0">
                 <a:solidFill>
                   <a:schemeClr val="tx1"/>
                 </a:solidFill>
@@ -3810,14 +3778,6 @@
               </a:rPr>
               <a:t>Ziel</a:t>
             </a:r>
-            <a:endParaRPr lang="de-CH" b="1" dirty="0">
-              <a:solidFill>
-                <a:schemeClr val="tx1"/>
-              </a:solidFill>
-              <a:latin typeface="Apple Chancery" charset="0"/>
-              <a:ea typeface="Apple Chancery" charset="0"/>
-              <a:cs typeface="Apple Chancery" charset="0"/>
-            </a:endParaRPr>
           </a:p>
         </p:txBody>
       </p:sp>
@@ -3866,7 +3826,7 @@
           <a:p>
             <a:pPr algn="ctr"/>
             <a:r>
-              <a:rPr lang="de-CH" sz="1200" b="1" dirty="0" smtClean="0">
+              <a:rPr lang="de-CH" sz="1200" b="1" dirty="0">
                 <a:solidFill>
                   <a:schemeClr val="tx1"/>
                 </a:solidFill>
@@ -3876,14 +3836,6 @@
               </a:rPr>
               <a:t>Einstellungen</a:t>
             </a:r>
-            <a:endParaRPr lang="de-CH" sz="1200" b="1" dirty="0">
-              <a:solidFill>
-                <a:schemeClr val="tx1"/>
-              </a:solidFill>
-              <a:latin typeface="Apple Chancery" charset="0"/>
-              <a:ea typeface="Apple Chancery" charset="0"/>
-              <a:cs typeface="Apple Chancery" charset="0"/>
-            </a:endParaRPr>
           </a:p>
         </p:txBody>
       </p:sp>
@@ -3942,20 +3894,12 @@
               <a:defRPr/>
             </a:pPr>
             <a:r>
-              <a:rPr lang="de-CH" b="1" u="sng" dirty="0" smtClean="0">
-                <a:solidFill>
-                  <a:schemeClr val="tx1"/>
-                </a:solidFill>
-              </a:rPr>
-              <a:t>Ziel </a:t>
-            </a:r>
-            <a:r>
               <a:rPr lang="de-CH" b="1" u="sng" dirty="0">
                 <a:solidFill>
                   <a:schemeClr val="tx1"/>
                 </a:solidFill>
               </a:rPr>
-              <a:t>des Spiels:</a:t>
+              <a:t>Ziel des Spiels:</a:t>
             </a:r>
             <a:endParaRPr lang="de-CH" sz="1400" b="1" u="sng" dirty="0">
               <a:solidFill>
@@ -3973,21 +3917,8 @@
                   <a:schemeClr val="tx1"/>
                 </a:solidFill>
               </a:rPr>
-              <a:t>Ziel dieses Spieles ist es 180 Kreditpunkte zu erzielen. In jeder Runde darf der Spieler entscheiden ob er eine Karte ziehen, eine Karte wegschmeissen oder diese Runde aussetzen möchte. </a:t>
-            </a:r>
-            <a:r>
-              <a:rPr lang="de-CH" sz="1400" dirty="0" smtClean="0">
-                <a:solidFill>
-                  <a:schemeClr val="tx1"/>
-                </a:solidFill>
-              </a:rPr>
-              <a:t>Hat ein Spieler über 180 Kreditpunkte erzielt, hat er verloren und scheidet aus dem Spiel aus.</a:t>
-            </a:r>
-            <a:endParaRPr lang="de-CH" sz="1400" dirty="0">
-              <a:solidFill>
-                <a:schemeClr val="tx1"/>
-              </a:solidFill>
-            </a:endParaRPr>
+              <a:t>Ziel dieses Spieles ist es 180 Kreditpunkte zu erzielen. In jeder Runde darf der Spieler entscheiden ob er eine Karte ziehen, eine Karte wegschmeissen oder diese Runde aussetzen möchte. Hat ein Spieler über 180 Kreditpunkte erzielt, hat er verloren und scheidet aus dem Spiel aus.</a:t>
+            </a:r>
           </a:p>
         </p:txBody>
       </p:sp>
@@ -4038,18 +3969,13 @@
           <a:p>
             <a:pPr algn="ctr"/>
             <a:r>
-              <a:rPr lang="de-CH" sz="1400" dirty="0" smtClean="0">
+              <a:rPr lang="de-CH" sz="1400" dirty="0">
                 <a:solidFill>
                   <a:schemeClr val="tx1"/>
                 </a:solidFill>
               </a:rPr>
               <a:t>Schliessen</a:t>
             </a:r>
-            <a:endParaRPr lang="de-CH" sz="1400" dirty="0">
-              <a:solidFill>
-                <a:schemeClr val="tx1"/>
-              </a:solidFill>
-            </a:endParaRPr>
           </a:p>
         </p:txBody>
       </p:sp>
@@ -4302,7 +4228,7 @@
           <a:p>
             <a:pPr algn="ctr"/>
             <a:r>
-              <a:rPr lang="de-CH" sz="3200" b="1" dirty="0" smtClean="0">
+              <a:rPr lang="de-CH" sz="3200" b="1" dirty="0">
                 <a:solidFill>
                   <a:schemeClr val="tx1"/>
                 </a:solidFill>
@@ -4312,14 +4238,6 @@
               </a:rPr>
               <a:t>Start</a:t>
             </a:r>
-            <a:endParaRPr lang="de-CH" sz="3200" b="1" dirty="0">
-              <a:solidFill>
-                <a:schemeClr val="tx1"/>
-              </a:solidFill>
-              <a:latin typeface="Apple Chancery" charset="0"/>
-              <a:ea typeface="Apple Chancery" charset="0"/>
-              <a:cs typeface="Apple Chancery" charset="0"/>
-            </a:endParaRPr>
           </a:p>
         </p:txBody>
       </p:sp>
@@ -4368,7 +4286,7 @@
           <a:p>
             <a:pPr algn="ctr"/>
             <a:r>
-              <a:rPr lang="de-CH" sz="2000" b="1" dirty="0" smtClean="0">
+              <a:rPr lang="de-CH" sz="2000" b="1" dirty="0">
                 <a:solidFill>
                   <a:schemeClr val="tx1"/>
                 </a:solidFill>
@@ -4434,7 +4352,7 @@
           <a:p>
             <a:pPr algn="ctr"/>
             <a:r>
-              <a:rPr lang="de-CH" sz="2400" b="1" dirty="0" smtClean="0">
+              <a:rPr lang="de-CH" sz="2400" b="1" dirty="0">
                 <a:solidFill>
                   <a:schemeClr val="tx1"/>
                 </a:solidFill>
@@ -4500,7 +4418,7 @@
           <a:p>
             <a:pPr algn="ctr"/>
             <a:r>
-              <a:rPr lang="de-CH" b="1" dirty="0" smtClean="0">
+              <a:rPr lang="de-CH" b="1" dirty="0">
                 <a:solidFill>
                   <a:schemeClr val="tx1"/>
                 </a:solidFill>
@@ -4510,14 +4428,6 @@
               </a:rPr>
               <a:t>Ziel</a:t>
             </a:r>
-            <a:endParaRPr lang="de-CH" b="1" dirty="0">
-              <a:solidFill>
-                <a:schemeClr val="tx1"/>
-              </a:solidFill>
-              <a:latin typeface="Apple Chancery" charset="0"/>
-              <a:ea typeface="Apple Chancery" charset="0"/>
-              <a:cs typeface="Apple Chancery" charset="0"/>
-            </a:endParaRPr>
           </a:p>
         </p:txBody>
       </p:sp>
@@ -4566,7 +4476,7 @@
           <a:p>
             <a:pPr algn="ctr"/>
             <a:r>
-              <a:rPr lang="de-CH" sz="1200" b="1" dirty="0" smtClean="0">
+              <a:rPr lang="de-CH" sz="1200" b="1" dirty="0">
                 <a:solidFill>
                   <a:schemeClr val="tx1"/>
                 </a:solidFill>
@@ -4576,14 +4486,6 @@
               </a:rPr>
               <a:t>Einstellungen</a:t>
             </a:r>
-            <a:endParaRPr lang="de-CH" sz="1200" b="1" dirty="0">
-              <a:solidFill>
-                <a:schemeClr val="tx1"/>
-              </a:solidFill>
-              <a:latin typeface="Apple Chancery" charset="0"/>
-              <a:ea typeface="Apple Chancery" charset="0"/>
-              <a:cs typeface="Apple Chancery" charset="0"/>
-            </a:endParaRPr>
           </a:p>
         </p:txBody>
       </p:sp>
@@ -4885,7 +4787,7 @@
           <a:lstStyle/>
           <a:p>
             <a:r>
-              <a:rPr lang="de-CH" sz="1600" dirty="0" smtClean="0">
+              <a:rPr lang="de-CH" sz="1600" dirty="0">
                 <a:solidFill>
                   <a:schemeClr val="tx1"/>
                 </a:solidFill>
@@ -4895,26 +4797,13 @@
           </a:p>
           <a:p>
             <a:r>
-              <a:rPr lang="de-CH" sz="1600" dirty="0" smtClean="0">
+              <a:rPr lang="de-CH" sz="1600" dirty="0">
                 <a:solidFill>
                   <a:schemeClr val="tx1"/>
                 </a:solidFill>
               </a:rPr>
-              <a:t>Johannes: Sali</a:t>
-            </a:r>
-            <a:r>
-              <a:rPr lang="de-CH" sz="1600" dirty="0" smtClean="0">
-                <a:solidFill>
-                  <a:schemeClr val="tx1"/>
-                </a:solidFill>
-              </a:rPr>
-              <a:t>!</a:t>
-            </a:r>
-            <a:endParaRPr lang="de-CH" sz="1600" dirty="0" smtClean="0">
-              <a:solidFill>
-                <a:schemeClr val="tx1"/>
-              </a:solidFill>
-            </a:endParaRPr>
+              <a:t>Johannes: Sali!</a:t>
+            </a:r>
           </a:p>
         </p:txBody>
       </p:sp>
@@ -4962,32 +4851,15 @@
           <a:lstStyle/>
           <a:p>
             <a:r>
-              <a:rPr lang="de-CH" i="1" dirty="0" smtClean="0">
+              <a:rPr lang="de-CH" i="1" dirty="0">
                 <a:solidFill>
                   <a:schemeClr val="bg1">
                     <a:lumMod val="75000"/>
                   </a:schemeClr>
                 </a:solidFill>
               </a:rPr>
-              <a:t>Text hier </a:t>
-            </a:r>
-            <a:r>
-              <a:rPr lang="de-CH" i="1" dirty="0" smtClean="0">
-                <a:solidFill>
-                  <a:schemeClr val="bg1">
-                    <a:lumMod val="75000"/>
-                  </a:schemeClr>
-                </a:solidFill>
-              </a:rPr>
-              <a:t>eingeben...</a:t>
-            </a:r>
-            <a:endParaRPr lang="de-CH" i="1" dirty="0">
-              <a:solidFill>
-                <a:schemeClr val="bg1">
-                  <a:lumMod val="75000"/>
-                </a:schemeClr>
-              </a:solidFill>
-            </a:endParaRPr>
+              <a:t>Text hier eingeben...</a:t>
+            </a:r>
           </a:p>
         </p:txBody>
       </p:sp>
@@ -5040,7 +4912,7 @@
               </a:spcAft>
             </a:pPr>
             <a:r>
-              <a:rPr lang="de-CH" sz="1600" dirty="0" smtClean="0">
+              <a:rPr lang="de-CH" sz="1600" dirty="0">
                 <a:solidFill>
                   <a:schemeClr val="tx1"/>
                 </a:solidFill>
@@ -5050,95 +4922,43 @@
           </a:p>
           <a:p>
             <a:r>
-              <a:rPr lang="de-CH" sz="1600" dirty="0" smtClean="0">
+              <a:rPr lang="de-CH" sz="1600" dirty="0">
                 <a:solidFill>
                   <a:schemeClr val="tx1"/>
                 </a:solidFill>
               </a:rPr>
-              <a:t>Anna: 	</a:t>
-            </a:r>
-            <a:r>
-              <a:rPr lang="de-CH" sz="1600" dirty="0" smtClean="0">
+              <a:t>Anna: 	40</a:t>
+            </a:r>
+          </a:p>
+          <a:p>
+            <a:r>
+              <a:rPr lang="de-CH" sz="1600" dirty="0">
                 <a:solidFill>
                   <a:schemeClr val="tx1"/>
                 </a:solidFill>
               </a:rPr>
-              <a:t>40</a:t>
-            </a:r>
-            <a:endParaRPr lang="de-CH" sz="1600" dirty="0" smtClean="0">
-              <a:solidFill>
-                <a:schemeClr val="tx1"/>
-              </a:solidFill>
-            </a:endParaRPr>
-          </a:p>
-          <a:p>
-            <a:r>
-              <a:rPr lang="de-CH" sz="1600" dirty="0" smtClean="0">
+              <a:t>Mei:	20</a:t>
+            </a:r>
+          </a:p>
+          <a:p>
+            <a:r>
+              <a:rPr lang="de-CH" sz="1600" dirty="0">
                 <a:solidFill>
                   <a:schemeClr val="tx1"/>
                 </a:solidFill>
               </a:rPr>
-              <a:t>Mei:	</a:t>
-            </a:r>
-            <a:r>
-              <a:rPr lang="de-CH" sz="1600" dirty="0" smtClean="0">
+              <a:t>Adrian:	10</a:t>
+            </a:r>
+          </a:p>
+          <a:p>
+            <a:r>
+              <a:rPr lang="de-CH" sz="1600" dirty="0">
                 <a:solidFill>
                   <a:schemeClr val="tx1"/>
                 </a:solidFill>
               </a:rPr>
-              <a:t>20</a:t>
-            </a:r>
-            <a:endParaRPr lang="de-CH" sz="1600" dirty="0" smtClean="0">
-              <a:solidFill>
-                <a:schemeClr val="tx1"/>
-              </a:solidFill>
-            </a:endParaRPr>
-          </a:p>
-          <a:p>
-            <a:r>
-              <a:rPr lang="de-CH" sz="1600" dirty="0" smtClean="0">
-                <a:solidFill>
-                  <a:schemeClr val="tx1"/>
-                </a:solidFill>
-              </a:rPr>
-              <a:t>Adrian:	</a:t>
-            </a:r>
-            <a:r>
-              <a:rPr lang="de-CH" sz="1600" dirty="0" smtClean="0">
-                <a:solidFill>
-                  <a:schemeClr val="tx1"/>
-                </a:solidFill>
-              </a:rPr>
-              <a:t>10</a:t>
-            </a:r>
-            <a:endParaRPr lang="de-CH" sz="1600" dirty="0" smtClean="0">
-              <a:solidFill>
-                <a:schemeClr val="tx1"/>
-              </a:solidFill>
-            </a:endParaRPr>
-          </a:p>
-          <a:p>
-            <a:r>
-              <a:rPr lang="de-CH" sz="1600" dirty="0" smtClean="0">
-                <a:solidFill>
-                  <a:schemeClr val="tx1"/>
-                </a:solidFill>
-              </a:rPr>
-              <a:t>Johannes:	</a:t>
-            </a:r>
-            <a:r>
-              <a:rPr lang="de-CH" sz="1600" dirty="0" smtClean="0">
-                <a:solidFill>
-                  <a:schemeClr val="tx1"/>
-                </a:solidFill>
-              </a:rPr>
-              <a:t>60</a:t>
-            </a:r>
-            <a:endParaRPr lang="de-CH" sz="1600" dirty="0">
-              <a:solidFill>
-                <a:schemeClr val="tx1"/>
-              </a:solidFill>
-            </a:endParaRPr>
+              <a:t>Johannes:	60</a:t>
+            </a:r>
           </a:p>
         </p:txBody>
       </p:sp>
@@ -5395,13 +5215,6 @@
   <p:clrMapOvr>
     <a:masterClrMapping/>
   </p:clrMapOvr>
-  <p:timing>
-    <p:tnLst>
-      <p:par>
-        <p:cTn id="1" dur="indefinite" restart="never" nodeType="tmRoot"/>
-      </p:par>
-    </p:tnLst>
-  </p:timing>
 </p:sld>
 </file>
 
@@ -5564,7 +5377,7 @@
           <a:lstStyle/>
           <a:p>
             <a:r>
-              <a:rPr lang="de-CH" sz="1600" dirty="0" smtClean="0">
+              <a:rPr lang="de-CH" sz="1600" dirty="0">
                 <a:solidFill>
                   <a:schemeClr val="tx1"/>
                 </a:solidFill>
@@ -5574,7 +5387,7 @@
           </a:p>
           <a:p>
             <a:r>
-              <a:rPr lang="de-CH" sz="1600" dirty="0" smtClean="0">
+              <a:rPr lang="de-CH" sz="1600" dirty="0">
                 <a:solidFill>
                   <a:schemeClr val="tx1"/>
                 </a:solidFill>
@@ -5584,7 +5397,7 @@
           </a:p>
           <a:p>
             <a:r>
-              <a:rPr lang="de-CH" sz="1600" dirty="0" smtClean="0">
+              <a:rPr lang="de-CH" sz="1600" dirty="0">
                 <a:solidFill>
                   <a:schemeClr val="tx1"/>
                 </a:solidFill>
@@ -5592,7 +5405,7 @@
               <a:t>Adrian: </a:t>
             </a:r>
             <a:r>
-              <a:rPr lang="de-CH" sz="1600" dirty="0" err="1" smtClean="0">
+              <a:rPr lang="de-CH" sz="1600" dirty="0" err="1">
                 <a:solidFill>
                   <a:schemeClr val="tx1"/>
                 </a:solidFill>
@@ -5600,7 +5413,7 @@
               <a:t>Hallöle</a:t>
             </a:r>
             <a:r>
-              <a:rPr lang="de-CH" sz="1600" dirty="0" smtClean="0">
+              <a:rPr lang="de-CH" sz="1600" dirty="0">
                 <a:solidFill>
                   <a:schemeClr val="tx1"/>
                 </a:solidFill>
@@ -5608,14 +5421,14 @@
               <a:t> </a:t>
             </a:r>
             <a:r>
-              <a:rPr lang="de-CH" sz="1600" dirty="0" err="1" smtClean="0">
+              <a:rPr lang="de-CH" sz="1600" dirty="0" err="1">
                 <a:solidFill>
                   <a:schemeClr val="tx1"/>
                 </a:solidFill>
               </a:rPr>
               <a:t>xD</a:t>
             </a:r>
-            <a:endParaRPr lang="de-CH" sz="1600" dirty="0" smtClean="0">
+            <a:endParaRPr lang="de-CH" sz="1600" dirty="0">
               <a:solidFill>
                 <a:schemeClr val="tx1"/>
               </a:solidFill>
@@ -5623,7 +5436,7 @@
           </a:p>
           <a:p>
             <a:r>
-              <a:rPr lang="de-CH" sz="1600" dirty="0" smtClean="0">
+              <a:rPr lang="de-CH" sz="1600" dirty="0">
                 <a:solidFill>
                   <a:schemeClr val="tx1"/>
                 </a:solidFill>
@@ -5660,15 +5473,7 @@
                   <a:schemeClr val="tx1"/>
                 </a:solidFill>
               </a:rPr>
-              <a:t> </a:t>
-            </a:r>
-            <a:r>
-              <a:rPr lang="de-CH" sz="1600" dirty="0" smtClean="0">
-                <a:solidFill>
-                  <a:schemeClr val="tx1"/>
-                </a:solidFill>
-              </a:rPr>
-              <a:t>^^</a:t>
+              <a:t> ^^</a:t>
             </a:r>
             <a:endParaRPr lang="de-CH" sz="1600" i="1" dirty="0">
               <a:solidFill>
@@ -5731,25 +5536,8 @@
                   </a:schemeClr>
                 </a:solidFill>
               </a:rPr>
-              <a:t>Text hier </a:t>
-            </a:r>
-            <a:r>
-              <a:rPr lang="de-CH" i="1" dirty="0" smtClean="0">
-                <a:solidFill>
-                  <a:schemeClr val="bg1">
-                    <a:lumMod val="75000"/>
-                  </a:schemeClr>
-                </a:solidFill>
-              </a:rPr>
-              <a:t>eingeben...</a:t>
-            </a:r>
-            <a:endParaRPr lang="de-CH" i="1" dirty="0">
-              <a:solidFill>
-                <a:schemeClr val="bg1">
-                  <a:lumMod val="75000"/>
-                </a:schemeClr>
-              </a:solidFill>
-            </a:endParaRPr>
+              <a:t>Text hier eingeben...</a:t>
+            </a:r>
           </a:p>
         </p:txBody>
       </p:sp>
@@ -5802,7 +5590,7 @@
               </a:spcAft>
             </a:pPr>
             <a:r>
-              <a:rPr lang="de-CH" sz="1600" dirty="0" smtClean="0">
+              <a:rPr lang="de-CH" sz="1600" dirty="0">
                 <a:solidFill>
                   <a:schemeClr val="tx1"/>
                 </a:solidFill>
@@ -5812,7 +5600,7 @@
           </a:p>
           <a:p>
             <a:r>
-              <a:rPr lang="de-CH" sz="1600" dirty="0" smtClean="0">
+              <a:rPr lang="de-CH" sz="1600" dirty="0">
                 <a:solidFill>
                   <a:schemeClr val="tx1"/>
                 </a:solidFill>
@@ -5822,7 +5610,7 @@
           </a:p>
           <a:p>
             <a:r>
-              <a:rPr lang="de-CH" sz="1600" dirty="0" smtClean="0">
+              <a:rPr lang="de-CH" sz="1600" dirty="0">
                 <a:solidFill>
                   <a:schemeClr val="tx1"/>
                 </a:solidFill>
@@ -5832,7 +5620,7 @@
           </a:p>
           <a:p>
             <a:r>
-              <a:rPr lang="de-CH" sz="1600" dirty="0" smtClean="0">
+              <a:rPr lang="de-CH" sz="1600" dirty="0">
                 <a:solidFill>
                   <a:schemeClr val="tx1"/>
                 </a:solidFill>
@@ -5842,18 +5630,13 @@
           </a:p>
           <a:p>
             <a:r>
-              <a:rPr lang="de-CH" sz="1600" dirty="0" smtClean="0">
+              <a:rPr lang="de-CH" sz="1600" dirty="0">
                 <a:solidFill>
                   <a:schemeClr val="tx1"/>
                 </a:solidFill>
               </a:rPr>
               <a:t>Johannes:	100</a:t>
             </a:r>
-            <a:endParaRPr lang="de-CH" sz="1600" dirty="0">
-              <a:solidFill>
-                <a:schemeClr val="tx1"/>
-              </a:solidFill>
-            </a:endParaRPr>
           </a:p>
         </p:txBody>
       </p:sp>
@@ -6881,13 +6664,6 @@
   <p:clrMapOvr>
     <a:masterClrMapping/>
   </p:clrMapOvr>
-  <p:timing>
-    <p:tnLst>
-      <p:par>
-        <p:cTn id="1" dur="indefinite" restart="never" nodeType="tmRoot"/>
-      </p:par>
-    </p:tnLst>
-  </p:timing>
 </p:sld>
 </file>
 
@@ -7050,7 +6826,7 @@
           <a:lstStyle/>
           <a:p>
             <a:r>
-              <a:rPr lang="de-CH" sz="1600" dirty="0" smtClean="0">
+              <a:rPr lang="de-CH" sz="1600" dirty="0">
                 <a:solidFill>
                   <a:schemeClr val="tx1"/>
                 </a:solidFill>
@@ -7060,7 +6836,7 @@
           </a:p>
           <a:p>
             <a:r>
-              <a:rPr lang="de-CH" sz="1600" dirty="0" smtClean="0">
+              <a:rPr lang="de-CH" sz="1600" dirty="0">
                 <a:solidFill>
                   <a:schemeClr val="tx1"/>
                 </a:solidFill>
@@ -7070,7 +6846,7 @@
           </a:p>
           <a:p>
             <a:r>
-              <a:rPr lang="de-CH" sz="1600" dirty="0" smtClean="0">
+              <a:rPr lang="de-CH" sz="1600" dirty="0">
                 <a:solidFill>
                   <a:schemeClr val="tx1"/>
                 </a:solidFill>
@@ -7078,7 +6854,7 @@
               <a:t>Adrian: </a:t>
             </a:r>
             <a:r>
-              <a:rPr lang="de-CH" sz="1600" dirty="0" err="1" smtClean="0">
+              <a:rPr lang="de-CH" sz="1600" dirty="0" err="1">
                 <a:solidFill>
                   <a:schemeClr val="tx1"/>
                 </a:solidFill>
@@ -7086,7 +6862,7 @@
               <a:t>Hallöle</a:t>
             </a:r>
             <a:r>
-              <a:rPr lang="de-CH" sz="1600" dirty="0" smtClean="0">
+              <a:rPr lang="de-CH" sz="1600" dirty="0">
                 <a:solidFill>
                   <a:schemeClr val="tx1"/>
                 </a:solidFill>
@@ -7094,14 +6870,14 @@
               <a:t> </a:t>
             </a:r>
             <a:r>
-              <a:rPr lang="de-CH" sz="1600" dirty="0" err="1" smtClean="0">
+              <a:rPr lang="de-CH" sz="1600" dirty="0" err="1">
                 <a:solidFill>
                   <a:schemeClr val="tx1"/>
                 </a:solidFill>
               </a:rPr>
               <a:t>xD</a:t>
             </a:r>
-            <a:endParaRPr lang="de-CH" sz="1600" dirty="0" smtClean="0">
+            <a:endParaRPr lang="de-CH" sz="1600" dirty="0">
               <a:solidFill>
                 <a:schemeClr val="tx1"/>
               </a:solidFill>
@@ -7109,7 +6885,7 @@
           </a:p>
           <a:p>
             <a:r>
-              <a:rPr lang="de-CH" sz="1600" dirty="0" smtClean="0">
+              <a:rPr lang="de-CH" sz="1600" dirty="0">
                 <a:solidFill>
                   <a:schemeClr val="tx1"/>
                 </a:solidFill>
@@ -7146,15 +6922,7 @@
                   <a:schemeClr val="tx1"/>
                 </a:solidFill>
               </a:rPr>
-              <a:t> </a:t>
-            </a:r>
-            <a:r>
-              <a:rPr lang="de-CH" sz="1600" dirty="0" smtClean="0">
-                <a:solidFill>
-                  <a:schemeClr val="tx1"/>
-                </a:solidFill>
-              </a:rPr>
-              <a:t>^^</a:t>
+              <a:t> ^^</a:t>
             </a:r>
             <a:endParaRPr lang="de-CH" sz="1600" i="1" dirty="0">
               <a:solidFill>
@@ -7210,7 +6978,7 @@
           <a:lstStyle/>
           <a:p>
             <a:r>
-              <a:rPr lang="de-CH" dirty="0" smtClean="0">
+              <a:rPr lang="de-CH" dirty="0">
                 <a:solidFill>
                   <a:schemeClr val="tx1"/>
                 </a:solidFill>
@@ -7276,7 +7044,7 @@
               </a:spcAft>
             </a:pPr>
             <a:r>
-              <a:rPr lang="de-CH" sz="1600" dirty="0" smtClean="0">
+              <a:rPr lang="de-CH" sz="1600" dirty="0">
                 <a:solidFill>
                   <a:schemeClr val="tx1"/>
                 </a:solidFill>
@@ -7286,7 +7054,7 @@
           </a:p>
           <a:p>
             <a:r>
-              <a:rPr lang="de-CH" sz="1600" dirty="0" smtClean="0">
+              <a:rPr lang="de-CH" sz="1600" dirty="0">
                 <a:solidFill>
                   <a:schemeClr val="tx1"/>
                 </a:solidFill>
@@ -7296,7 +7064,7 @@
           </a:p>
           <a:p>
             <a:r>
-              <a:rPr lang="de-CH" sz="1600" dirty="0" smtClean="0">
+              <a:rPr lang="de-CH" sz="1600" dirty="0">
                 <a:solidFill>
                   <a:schemeClr val="tx1"/>
                 </a:solidFill>
@@ -7306,7 +7074,7 @@
           </a:p>
           <a:p>
             <a:r>
-              <a:rPr lang="de-CH" sz="1600" dirty="0" smtClean="0">
+              <a:rPr lang="de-CH" sz="1600" dirty="0">
                 <a:solidFill>
                   <a:schemeClr val="tx1"/>
                 </a:solidFill>
@@ -7316,18 +7084,13 @@
           </a:p>
           <a:p>
             <a:r>
-              <a:rPr lang="de-CH" sz="1600" dirty="0" smtClean="0">
+              <a:rPr lang="de-CH" sz="1600" dirty="0">
                 <a:solidFill>
                   <a:schemeClr val="tx1"/>
                 </a:solidFill>
               </a:rPr>
               <a:t>Johannes:	100</a:t>
             </a:r>
-            <a:endParaRPr lang="de-CH" sz="1600" dirty="0">
-              <a:solidFill>
-                <a:schemeClr val="tx1"/>
-              </a:solidFill>
-            </a:endParaRPr>
           </a:p>
         </p:txBody>
       </p:sp>
@@ -8355,13 +8118,6 @@
   <p:clrMapOvr>
     <a:masterClrMapping/>
   </p:clrMapOvr>
-  <p:timing>
-    <p:tnLst>
-      <p:par>
-        <p:cTn id="1" dur="indefinite" restart="never" nodeType="tmRoot"/>
-      </p:par>
-    </p:tnLst>
-  </p:timing>
 </p:sld>
 </file>
 
@@ -8524,7 +8280,7 @@
           <a:lstStyle/>
           <a:p>
             <a:r>
-              <a:rPr lang="de-CH" sz="1600" dirty="0" smtClean="0">
+              <a:rPr lang="de-CH" sz="1600" dirty="0">
                 <a:solidFill>
                   <a:schemeClr val="tx1"/>
                 </a:solidFill>
@@ -8534,7 +8290,7 @@
           </a:p>
           <a:p>
             <a:r>
-              <a:rPr lang="de-CH" sz="1600" dirty="0" smtClean="0">
+              <a:rPr lang="de-CH" sz="1600" dirty="0">
                 <a:solidFill>
                   <a:schemeClr val="tx1"/>
                 </a:solidFill>
@@ -8544,7 +8300,7 @@
           </a:p>
           <a:p>
             <a:r>
-              <a:rPr lang="de-CH" sz="1600" dirty="0" smtClean="0">
+              <a:rPr lang="de-CH" sz="1600" dirty="0">
                 <a:solidFill>
                   <a:schemeClr val="tx1"/>
                 </a:solidFill>
@@ -8552,7 +8308,7 @@
               <a:t>Adrian: </a:t>
             </a:r>
             <a:r>
-              <a:rPr lang="de-CH" sz="1600" dirty="0" err="1" smtClean="0">
+              <a:rPr lang="de-CH" sz="1600" dirty="0" err="1">
                 <a:solidFill>
                   <a:schemeClr val="tx1"/>
                 </a:solidFill>
@@ -8560,7 +8316,7 @@
               <a:t>Hallöle</a:t>
             </a:r>
             <a:r>
-              <a:rPr lang="de-CH" sz="1600" dirty="0" smtClean="0">
+              <a:rPr lang="de-CH" sz="1600" dirty="0">
                 <a:solidFill>
                   <a:schemeClr val="tx1"/>
                 </a:solidFill>
@@ -8568,14 +8324,14 @@
               <a:t> </a:t>
             </a:r>
             <a:r>
-              <a:rPr lang="de-CH" sz="1600" dirty="0" err="1" smtClean="0">
+              <a:rPr lang="de-CH" sz="1600" dirty="0" err="1">
                 <a:solidFill>
                   <a:schemeClr val="tx1"/>
                 </a:solidFill>
               </a:rPr>
               <a:t>xD</a:t>
             </a:r>
-            <a:endParaRPr lang="de-CH" sz="1600" dirty="0" smtClean="0">
+            <a:endParaRPr lang="de-CH" sz="1600" dirty="0">
               <a:solidFill>
                 <a:schemeClr val="tx1"/>
               </a:solidFill>
@@ -8583,7 +8339,7 @@
           </a:p>
           <a:p>
             <a:r>
-              <a:rPr lang="de-CH" sz="1600" dirty="0" smtClean="0">
+              <a:rPr lang="de-CH" sz="1600" dirty="0">
                 <a:solidFill>
                   <a:schemeClr val="tx1"/>
                 </a:solidFill>
@@ -8620,35 +8376,19 @@
                   <a:schemeClr val="tx1"/>
                 </a:solidFill>
               </a:rPr>
-              <a:t> </a:t>
-            </a:r>
-            <a:r>
-              <a:rPr lang="de-CH" sz="1600" dirty="0" smtClean="0">
-                <a:solidFill>
-                  <a:schemeClr val="tx1"/>
-                </a:solidFill>
-              </a:rPr>
-              <a:t>^^</a:t>
-            </a:r>
-          </a:p>
-          <a:p>
-            <a:r>
-              <a:rPr lang="de-CH" sz="1600" dirty="0" smtClean="0">
-                <a:solidFill>
-                  <a:schemeClr val="tx1"/>
-                </a:solidFill>
-              </a:rPr>
-              <a:t>Mei: </a:t>
-            </a:r>
+              <a:t> ^^</a:t>
+            </a:r>
+          </a:p>
+          <a:p>
             <a:r>
               <a:rPr lang="de-CH" sz="1600" dirty="0">
                 <a:solidFill>
                   <a:schemeClr val="tx1"/>
                 </a:solidFill>
               </a:rPr>
-              <a:t>Ich verliere diese Runde... :(</a:t>
-            </a:r>
-            <a:endParaRPr lang="de-CH" sz="1600" i="1" dirty="0" smtClean="0">
+              <a:t>Mei: Ich verliere diese Runde... :(</a:t>
+            </a:r>
+            <a:endParaRPr lang="de-CH" sz="1600" i="1" dirty="0">
               <a:solidFill>
                 <a:schemeClr val="bg1">
                   <a:lumMod val="75000"/>
@@ -8711,13 +8451,6 @@
               </a:rPr>
               <a:t>Text hier eingeben...</a:t>
             </a:r>
-            <a:endParaRPr lang="de-CH" i="1" dirty="0">
-              <a:solidFill>
-                <a:schemeClr val="bg1">
-                  <a:lumMod val="75000"/>
-                </a:schemeClr>
-              </a:solidFill>
-            </a:endParaRPr>
           </a:p>
         </p:txBody>
       </p:sp>
@@ -8770,7 +8503,7 @@
               </a:spcAft>
             </a:pPr>
             <a:r>
-              <a:rPr lang="de-CH" sz="1600" dirty="0" smtClean="0">
+              <a:rPr lang="de-CH" sz="1600" dirty="0">
                 <a:solidFill>
                   <a:schemeClr val="tx1"/>
                 </a:solidFill>
@@ -8780,7 +8513,7 @@
           </a:p>
           <a:p>
             <a:r>
-              <a:rPr lang="de-CH" sz="1600" dirty="0" smtClean="0">
+              <a:rPr lang="de-CH" sz="1600" dirty="0">
                 <a:solidFill>
                   <a:schemeClr val="tx1"/>
                 </a:solidFill>
@@ -8790,7 +8523,7 @@
           </a:p>
           <a:p>
             <a:r>
-              <a:rPr lang="de-CH" sz="1600" dirty="0" smtClean="0">
+              <a:rPr lang="de-CH" sz="1600" dirty="0">
                 <a:solidFill>
                   <a:schemeClr val="tx1"/>
                 </a:solidFill>
@@ -8800,7 +8533,7 @@
           </a:p>
           <a:p>
             <a:r>
-              <a:rPr lang="de-CH" sz="1600" dirty="0" smtClean="0">
+              <a:rPr lang="de-CH" sz="1600" dirty="0">
                 <a:solidFill>
                   <a:schemeClr val="tx1"/>
                 </a:solidFill>
@@ -8810,18 +8543,13 @@
           </a:p>
           <a:p>
             <a:r>
-              <a:rPr lang="de-CH" sz="1600" dirty="0" smtClean="0">
+              <a:rPr lang="de-CH" sz="1600" dirty="0">
                 <a:solidFill>
                   <a:schemeClr val="tx1"/>
                 </a:solidFill>
               </a:rPr>
               <a:t>Johannes:	100</a:t>
             </a:r>
-            <a:endParaRPr lang="de-CH" sz="1600" dirty="0">
-              <a:solidFill>
-                <a:schemeClr val="tx1"/>
-              </a:solidFill>
-            </a:endParaRPr>
           </a:p>
         </p:txBody>
       </p:sp>
@@ -9849,13 +9577,6 @@
   <p:clrMapOvr>
     <a:masterClrMapping/>
   </p:clrMapOvr>
-  <p:timing>
-    <p:tnLst>
-      <p:par>
-        <p:cTn id="1" dur="indefinite" restart="never" nodeType="tmRoot"/>
-      </p:par>
-    </p:tnLst>
-  </p:timing>
 </p:sld>
 </file>
 

</xml_diff>

<commit_message>
Gantt-Projekt bearbeitet und PP-Präsentation ergänzt
</commit_message>
<xml_diff>
--- a/documents/Meilensteine/Meilenstein I/mockup.pptx
+++ b/documents/Meilensteine/Meilenstein I/mockup.pptx
@@ -3433,7 +3433,7 @@
           <a:p>
             <a:pPr algn="ctr"/>
             <a:r>
-              <a:rPr lang="de-CH" i="1" smtClean="0">
+              <a:rPr lang="de-CH" i="1">
                 <a:solidFill>
                   <a:schemeClr val="tx1"/>
                 </a:solidFill>
@@ -5133,18 +5133,13 @@
           <a:p>
             <a:pPr algn="ctr"/>
             <a:r>
-              <a:rPr lang="de-CH" i="1" dirty="0" smtClean="0">
+              <a:rPr lang="de-CH" i="1" dirty="0">
                 <a:solidFill>
                   <a:schemeClr val="tx1"/>
                 </a:solidFill>
               </a:rPr>
               <a:t>Chat abgesendet</a:t>
             </a:r>
-            <a:endParaRPr lang="de-CH" i="1" dirty="0">
-              <a:solidFill>
-                <a:schemeClr val="tx1"/>
-              </a:solidFill>
-            </a:endParaRPr>
           </a:p>
         </p:txBody>
       </p:sp>
@@ -5158,13 +5153,6 @@
   <p:clrMapOvr>
     <a:masterClrMapping/>
   </p:clrMapOvr>
-  <p:timing>
-    <p:tnLst>
-      <p:par>
-        <p:cTn id="1" dur="indefinite" restart="never" nodeType="tmRoot"/>
-      </p:par>
-    </p:tnLst>
-  </p:timing>
 </p:sld>
 </file>
 
@@ -6759,18 +6747,13 @@
           <a:p>
             <a:pPr algn="ctr"/>
             <a:r>
-              <a:rPr lang="de-CH" dirty="0" smtClean="0">
+              <a:rPr lang="de-CH" dirty="0">
                 <a:solidFill>
                   <a:schemeClr val="accent3"/>
                 </a:solidFill>
               </a:rPr>
               <a:t>Eine Karte wegschmeissen</a:t>
             </a:r>
-            <a:endParaRPr lang="de-CH" dirty="0">
-              <a:solidFill>
-                <a:schemeClr val="accent3"/>
-              </a:solidFill>
-            </a:endParaRPr>
           </a:p>
         </p:txBody>
       </p:sp>
@@ -6814,18 +6797,13 @@
           <a:p>
             <a:pPr algn="ctr"/>
             <a:r>
-              <a:rPr lang="de-CH" dirty="0" smtClean="0">
+              <a:rPr lang="de-CH" dirty="0">
                 <a:solidFill>
                   <a:schemeClr val="tx1"/>
                 </a:solidFill>
               </a:rPr>
               <a:t>Eine Karte ziehen</a:t>
             </a:r>
-            <a:endParaRPr lang="de-CH" dirty="0">
-              <a:solidFill>
-                <a:schemeClr val="tx1"/>
-              </a:solidFill>
-            </a:endParaRPr>
           </a:p>
         </p:txBody>
       </p:sp>
@@ -6869,18 +6847,13 @@
           <a:p>
             <a:pPr algn="ctr"/>
             <a:r>
-              <a:rPr lang="de-CH" dirty="0" smtClean="0">
+              <a:rPr lang="de-CH" dirty="0">
                 <a:solidFill>
                   <a:schemeClr val="tx1"/>
                 </a:solidFill>
               </a:rPr>
               <a:t>Keine Karte ziehen</a:t>
             </a:r>
-            <a:endParaRPr lang="de-CH" dirty="0">
-              <a:solidFill>
-                <a:schemeClr val="tx1"/>
-              </a:solidFill>
-            </a:endParaRPr>
           </a:p>
         </p:txBody>
       </p:sp>
@@ -6932,18 +6905,13 @@
           <a:p>
             <a:pPr algn="ctr"/>
             <a:r>
-              <a:rPr lang="de-CH" i="1" dirty="0" smtClean="0">
+              <a:rPr lang="de-CH" i="1" dirty="0">
                 <a:solidFill>
                   <a:schemeClr val="tx1"/>
                 </a:solidFill>
               </a:rPr>
               <a:t>Optionen pro Runde</a:t>
             </a:r>
-            <a:endParaRPr lang="de-CH" i="1" dirty="0">
-              <a:solidFill>
-                <a:schemeClr val="tx1"/>
-              </a:solidFill>
-            </a:endParaRPr>
           </a:p>
         </p:txBody>
       </p:sp>
@@ -6957,13 +6925,6 @@
   <p:clrMapOvr>
     <a:masterClrMapping/>
   </p:clrMapOvr>
-  <p:timing>
-    <p:tnLst>
-      <p:par>
-        <p:cTn id="1" dur="indefinite" restart="never" nodeType="tmRoot"/>
-      </p:par>
-    </p:tnLst>
-  </p:timing>
 </p:sld>
 </file>
 
@@ -7354,15 +7315,25 @@
                   <a:schemeClr val="tx1"/>
                 </a:solidFill>
               </a:rPr>
-              <a:t>Momentaner Stand der </a:t>
-            </a:r>
-            <a:r>
-              <a:rPr lang="de-CH" sz="1600" dirty="0" smtClean="0">
-                <a:solidFill>
-                  <a:schemeClr val="tx1"/>
-                </a:solidFill>
-              </a:rPr>
-              <a:t>Konten</a:t>
+              <a:t>Momentaner Stand der Konten</a:t>
+            </a:r>
+          </a:p>
+          <a:p>
+            <a:r>
+              <a:rPr lang="de-CH" sz="1600" dirty="0">
+                <a:solidFill>
+                  <a:schemeClr val="tx1"/>
+                </a:solidFill>
+              </a:rPr>
+              <a:t>Anna: 	180 </a:t>
+            </a:r>
+            <a:r>
+              <a:rPr lang="de-CH" sz="1600" dirty="0" err="1">
+                <a:solidFill>
+                  <a:schemeClr val="tx1"/>
+                </a:solidFill>
+              </a:rPr>
+              <a:t>Coins</a:t>
             </a:r>
             <a:endParaRPr lang="de-CH" sz="1600" dirty="0">
               <a:solidFill>
@@ -7377,18 +7348,10 @@
                   <a:schemeClr val="tx1"/>
                 </a:solidFill>
               </a:rPr>
-              <a:t>Anna: 	</a:t>
-            </a:r>
-            <a:r>
-              <a:rPr lang="de-CH" sz="1600" dirty="0" smtClean="0">
-                <a:solidFill>
-                  <a:schemeClr val="tx1"/>
-                </a:solidFill>
-              </a:rPr>
-              <a:t>180 </a:t>
-            </a:r>
-            <a:r>
-              <a:rPr lang="de-CH" sz="1600" dirty="0" err="1" smtClean="0">
+              <a:t>Mei:	140 </a:t>
+            </a:r>
+            <a:r>
+              <a:rPr lang="de-CH" sz="1600" dirty="0" err="1">
                 <a:solidFill>
                   <a:schemeClr val="tx1"/>
                 </a:solidFill>
@@ -7408,26 +7371,10 @@
                   <a:schemeClr val="tx1"/>
                 </a:solidFill>
               </a:rPr>
-              <a:t>Mei:	</a:t>
-            </a:r>
-            <a:r>
-              <a:rPr lang="de-CH" sz="1600" dirty="0" smtClean="0">
-                <a:solidFill>
-                  <a:schemeClr val="tx1"/>
-                </a:solidFill>
-              </a:rPr>
-              <a:t>14</a:t>
-            </a:r>
-            <a:r>
-              <a:rPr lang="de-CH" sz="1600" dirty="0" smtClean="0">
-                <a:solidFill>
-                  <a:schemeClr val="tx1"/>
-                </a:solidFill>
-              </a:rPr>
-              <a:t>0 </a:t>
-            </a:r>
-            <a:r>
-              <a:rPr lang="de-CH" sz="1600" dirty="0" err="1" smtClean="0">
+              <a:t>Adrian:	150 </a:t>
+            </a:r>
+            <a:r>
+              <a:rPr lang="de-CH" sz="1600" dirty="0" err="1">
                 <a:solidFill>
                   <a:schemeClr val="tx1"/>
                 </a:solidFill>
@@ -7447,49 +7394,10 @@
                   <a:schemeClr val="tx1"/>
                 </a:solidFill>
               </a:rPr>
-              <a:t>Adrian:	</a:t>
-            </a:r>
-            <a:r>
-              <a:rPr lang="de-CH" sz="1600" dirty="0" smtClean="0">
-                <a:solidFill>
-                  <a:schemeClr val="tx1"/>
-                </a:solidFill>
-              </a:rPr>
-              <a:t>150 </a:t>
-            </a:r>
-            <a:r>
-              <a:rPr lang="de-CH" sz="1600" dirty="0" err="1" smtClean="0">
-                <a:solidFill>
-                  <a:schemeClr val="tx1"/>
-                </a:solidFill>
-              </a:rPr>
-              <a:t>Coins</a:t>
-            </a:r>
-            <a:endParaRPr lang="de-CH" sz="1600" dirty="0">
-              <a:solidFill>
-                <a:schemeClr val="tx1"/>
-              </a:solidFill>
-            </a:endParaRPr>
-          </a:p>
-          <a:p>
-            <a:r>
-              <a:rPr lang="de-CH" sz="1600" dirty="0">
-                <a:solidFill>
-                  <a:schemeClr val="tx1"/>
-                </a:solidFill>
-              </a:rPr>
-              <a:t>Johannes:	</a:t>
-            </a:r>
-            <a:r>
-              <a:rPr lang="de-CH" sz="1600" dirty="0" smtClean="0">
-                <a:solidFill>
-                  <a:schemeClr val="tx1"/>
-                </a:solidFill>
-              </a:rPr>
-              <a:t>130 </a:t>
-            </a:r>
-            <a:r>
-              <a:rPr lang="de-CH" sz="1600" dirty="0" err="1" smtClean="0">
+              <a:t>Johannes:	130 </a:t>
+            </a:r>
+            <a:r>
+              <a:rPr lang="de-CH" sz="1600" dirty="0" err="1">
                 <a:solidFill>
                   <a:schemeClr val="tx1"/>
                 </a:solidFill>
@@ -8611,18 +8519,13 @@
           <a:p>
             <a:pPr algn="ctr"/>
             <a:r>
-              <a:rPr lang="de-CH" dirty="0" smtClean="0">
+              <a:rPr lang="de-CH" dirty="0">
                 <a:solidFill>
                   <a:schemeClr val="tx1"/>
                 </a:solidFill>
               </a:rPr>
               <a:t>Eine Karte wegschmeissen</a:t>
             </a:r>
-            <a:endParaRPr lang="de-CH" dirty="0">
-              <a:solidFill>
-                <a:schemeClr val="tx1"/>
-              </a:solidFill>
-            </a:endParaRPr>
           </a:p>
         </p:txBody>
       </p:sp>
@@ -8666,18 +8569,13 @@
           <a:p>
             <a:pPr algn="ctr"/>
             <a:r>
-              <a:rPr lang="de-CH" dirty="0" smtClean="0">
+              <a:rPr lang="de-CH" dirty="0">
                 <a:solidFill>
                   <a:schemeClr val="tx1"/>
                 </a:solidFill>
               </a:rPr>
               <a:t>Eine Karte ziehen</a:t>
             </a:r>
-            <a:endParaRPr lang="de-CH" dirty="0">
-              <a:solidFill>
-                <a:schemeClr val="tx1"/>
-              </a:solidFill>
-            </a:endParaRPr>
           </a:p>
         </p:txBody>
       </p:sp>
@@ -8721,18 +8619,13 @@
           <a:p>
             <a:pPr algn="ctr"/>
             <a:r>
-              <a:rPr lang="de-CH" dirty="0" smtClean="0">
+              <a:rPr lang="de-CH" dirty="0">
                 <a:solidFill>
                   <a:schemeClr val="tx1"/>
                 </a:solidFill>
               </a:rPr>
               <a:t>Keine Karte ziehen</a:t>
             </a:r>
-            <a:endParaRPr lang="de-CH" dirty="0">
-              <a:solidFill>
-                <a:schemeClr val="tx1"/>
-              </a:solidFill>
-            </a:endParaRPr>
           </a:p>
         </p:txBody>
       </p:sp>
@@ -8832,18 +8725,13 @@
           <a:p>
             <a:pPr algn="ctr"/>
             <a:r>
-              <a:rPr lang="de-CH" i="1" dirty="0" smtClean="0">
+              <a:rPr lang="de-CH" i="1" dirty="0">
                 <a:solidFill>
                   <a:schemeClr val="tx1"/>
                 </a:solidFill>
               </a:rPr>
               <a:t>Optionen pro Runde </a:t>
             </a:r>
-            <a:endParaRPr lang="de-CH" i="1" dirty="0">
-              <a:solidFill>
-                <a:schemeClr val="tx1"/>
-              </a:solidFill>
-            </a:endParaRPr>
           </a:p>
         </p:txBody>
       </p:sp>
@@ -9325,15 +9213,25 @@
                   <a:schemeClr val="tx1"/>
                 </a:solidFill>
               </a:rPr>
-              <a:t>Momentaner Stand der </a:t>
-            </a:r>
-            <a:r>
-              <a:rPr lang="de-CH" sz="1600" dirty="0" smtClean="0">
-                <a:solidFill>
-                  <a:schemeClr val="tx1"/>
-                </a:solidFill>
-              </a:rPr>
-              <a:t>Konten</a:t>
+              <a:t>Momentaner Stand der Konten</a:t>
+            </a:r>
+          </a:p>
+          <a:p>
+            <a:r>
+              <a:rPr lang="de-CH" sz="1600" dirty="0">
+                <a:solidFill>
+                  <a:schemeClr val="tx1"/>
+                </a:solidFill>
+              </a:rPr>
+              <a:t>Anna: 	170 </a:t>
+            </a:r>
+            <a:r>
+              <a:rPr lang="de-CH" sz="1600" dirty="0" err="1">
+                <a:solidFill>
+                  <a:schemeClr val="tx1"/>
+                </a:solidFill>
+              </a:rPr>
+              <a:t>Coins</a:t>
             </a:r>
             <a:endParaRPr lang="de-CH" sz="1600" dirty="0">
               <a:solidFill>
@@ -9348,18 +9246,10 @@
                   <a:schemeClr val="tx1"/>
                 </a:solidFill>
               </a:rPr>
-              <a:t>Anna: 	</a:t>
-            </a:r>
-            <a:r>
-              <a:rPr lang="de-CH" sz="1600" dirty="0" smtClean="0">
-                <a:solidFill>
-                  <a:schemeClr val="tx1"/>
-                </a:solidFill>
-              </a:rPr>
-              <a:t>170 </a:t>
-            </a:r>
-            <a:r>
-              <a:rPr lang="de-CH" sz="1600" dirty="0" err="1" smtClean="0">
+              <a:t>Mei:	140 </a:t>
+            </a:r>
+            <a:r>
+              <a:rPr lang="de-CH" sz="1600" dirty="0" err="1">
                 <a:solidFill>
                   <a:schemeClr val="tx1"/>
                 </a:solidFill>
@@ -9379,26 +9269,10 @@
                   <a:schemeClr val="tx1"/>
                 </a:solidFill>
               </a:rPr>
-              <a:t>Mei:	</a:t>
-            </a:r>
-            <a:r>
-              <a:rPr lang="de-CH" sz="1600" dirty="0" smtClean="0">
-                <a:solidFill>
-                  <a:schemeClr val="tx1"/>
-                </a:solidFill>
-              </a:rPr>
-              <a:t>14</a:t>
-            </a:r>
-            <a:r>
-              <a:rPr lang="de-CH" sz="1600" dirty="0" smtClean="0">
-                <a:solidFill>
-                  <a:schemeClr val="tx1"/>
-                </a:solidFill>
-              </a:rPr>
-              <a:t>0 </a:t>
-            </a:r>
-            <a:r>
-              <a:rPr lang="de-CH" sz="1600" dirty="0" err="1" smtClean="0">
+              <a:t>Adrian:	150 </a:t>
+            </a:r>
+            <a:r>
+              <a:rPr lang="de-CH" sz="1600" dirty="0" err="1">
                 <a:solidFill>
                   <a:schemeClr val="tx1"/>
                 </a:solidFill>
@@ -9418,49 +9292,10 @@
                   <a:schemeClr val="tx1"/>
                 </a:solidFill>
               </a:rPr>
-              <a:t>Adrian:	</a:t>
-            </a:r>
-            <a:r>
-              <a:rPr lang="de-CH" sz="1600" dirty="0" smtClean="0">
-                <a:solidFill>
-                  <a:schemeClr val="tx1"/>
-                </a:solidFill>
-              </a:rPr>
-              <a:t>150 </a:t>
-            </a:r>
-            <a:r>
-              <a:rPr lang="de-CH" sz="1600" dirty="0" err="1" smtClean="0">
-                <a:solidFill>
-                  <a:schemeClr val="tx1"/>
-                </a:solidFill>
-              </a:rPr>
-              <a:t>Coins</a:t>
-            </a:r>
-            <a:endParaRPr lang="de-CH" sz="1600" dirty="0">
-              <a:solidFill>
-                <a:schemeClr val="tx1"/>
-              </a:solidFill>
-            </a:endParaRPr>
-          </a:p>
-          <a:p>
-            <a:r>
-              <a:rPr lang="de-CH" sz="1600" dirty="0">
-                <a:solidFill>
-                  <a:schemeClr val="tx1"/>
-                </a:solidFill>
-              </a:rPr>
-              <a:t>Johannes:	</a:t>
-            </a:r>
-            <a:r>
-              <a:rPr lang="de-CH" sz="1600" dirty="0" smtClean="0">
-                <a:solidFill>
-                  <a:schemeClr val="tx1"/>
-                </a:solidFill>
-              </a:rPr>
-              <a:t>130 </a:t>
-            </a:r>
-            <a:r>
-              <a:rPr lang="de-CH" sz="1600" dirty="0" err="1" smtClean="0">
+              <a:t>Johannes:	130 </a:t>
+            </a:r>
+            <a:r>
+              <a:rPr lang="de-CH" sz="1600" dirty="0" err="1">
                 <a:solidFill>
                   <a:schemeClr val="tx1"/>
                 </a:solidFill>
@@ -10582,18 +10417,13 @@
           <a:p>
             <a:pPr algn="ctr"/>
             <a:r>
-              <a:rPr lang="de-CH" dirty="0" smtClean="0">
+              <a:rPr lang="de-CH" dirty="0">
                 <a:solidFill>
                   <a:schemeClr val="tx1"/>
                 </a:solidFill>
               </a:rPr>
               <a:t>Eine Karte wegschmeissen</a:t>
             </a:r>
-            <a:endParaRPr lang="de-CH" dirty="0">
-              <a:solidFill>
-                <a:schemeClr val="tx1"/>
-              </a:solidFill>
-            </a:endParaRPr>
           </a:p>
         </p:txBody>
       </p:sp>
@@ -10637,18 +10467,13 @@
           <a:p>
             <a:pPr algn="ctr"/>
             <a:r>
-              <a:rPr lang="de-CH" dirty="0" smtClean="0">
+              <a:rPr lang="de-CH" dirty="0">
                 <a:solidFill>
                   <a:schemeClr val="tx1"/>
                 </a:solidFill>
               </a:rPr>
               <a:t>Eine Karte ziehen</a:t>
             </a:r>
-            <a:endParaRPr lang="de-CH" dirty="0">
-              <a:solidFill>
-                <a:schemeClr val="tx1"/>
-              </a:solidFill>
-            </a:endParaRPr>
           </a:p>
         </p:txBody>
       </p:sp>
@@ -10692,18 +10517,13 @@
           <a:p>
             <a:pPr algn="ctr"/>
             <a:r>
-              <a:rPr lang="de-CH" dirty="0" smtClean="0">
+              <a:rPr lang="de-CH" dirty="0">
                 <a:solidFill>
                   <a:schemeClr val="tx1"/>
                 </a:solidFill>
               </a:rPr>
               <a:t>Keine Karte ziehen</a:t>
             </a:r>
-            <a:endParaRPr lang="de-CH" dirty="0">
-              <a:solidFill>
-                <a:schemeClr val="tx1"/>
-              </a:solidFill>
-            </a:endParaRPr>
           </a:p>
         </p:txBody>
       </p:sp>
@@ -10801,7 +10621,7 @@
           <a:p>
             <a:pPr algn="ctr"/>
             <a:r>
-              <a:rPr lang="de-CH" i="1" dirty="0" err="1" smtClean="0">
+              <a:rPr lang="de-CH" i="1" dirty="0" err="1">
                 <a:solidFill>
                   <a:schemeClr val="tx1"/>
                 </a:solidFill>
@@ -10809,18 +10629,13 @@
               <a:t>Coins</a:t>
             </a:r>
             <a:r>
-              <a:rPr lang="de-CH" i="1" dirty="0" smtClean="0">
+              <a:rPr lang="de-CH" i="1" dirty="0">
                 <a:solidFill>
                   <a:schemeClr val="tx1"/>
                 </a:solidFill>
               </a:rPr>
               <a:t>-Abzug</a:t>
             </a:r>
-            <a:endParaRPr lang="de-CH" i="1" dirty="0">
-              <a:solidFill>
-                <a:schemeClr val="tx1"/>
-              </a:solidFill>
-            </a:endParaRPr>
           </a:p>
         </p:txBody>
       </p:sp>
@@ -10834,13 +10649,6 @@
   <p:clrMapOvr>
     <a:masterClrMapping/>
   </p:clrMapOvr>
-  <p:timing>
-    <p:tnLst>
-      <p:par>
-        <p:cTn id="1" dur="indefinite" restart="never" nodeType="tmRoot"/>
-      </p:par>
-    </p:tnLst>
-  </p:timing>
 </p:sld>
 </file>
 
@@ -10877,10 +10685,9 @@
           <a:lstStyle/>
           <a:p>
             <a:r>
-              <a:rPr lang="de-CH" dirty="0" smtClean="0"/>
+              <a:rPr lang="de-CH" dirty="0"/>
               <a:t>Karten</a:t>
             </a:r>
-            <a:endParaRPr lang="de-CH" dirty="0"/>
           </a:p>
         </p:txBody>
       </p:sp>
@@ -10892,7 +10699,7 @@
         </p:nvGrpSpPr>
         <p:grpSpPr>
           <a:xfrm>
-            <a:off x="838200" y="1843777"/>
+            <a:off x="1105125" y="2194532"/>
             <a:ext cx="2280920" cy="3743165"/>
             <a:chOff x="838200" y="1843778"/>
             <a:chExt cx="1980000" cy="3249332"/>
@@ -11041,10 +10848,9 @@
               <a:p>
                 <a:pPr algn="ctr"/>
                 <a:r>
-                  <a:rPr lang="de-CH" smtClean="0"/>
+                  <a:rPr lang="de-CH"/>
                   <a:t>20</a:t>
                 </a:r>
-                <a:endParaRPr lang="de-CH"/>
               </a:p>
             </p:txBody>
           </p:sp>
@@ -11073,10 +10879,9 @@
             <a:p>
               <a:pPr algn="ctr"/>
               <a:r>
-                <a:rPr lang="de-CH" dirty="0" smtClean="0"/>
+                <a:rPr lang="de-CH" dirty="0"/>
                 <a:t>Normale Karten</a:t>
               </a:r>
-              <a:endParaRPr lang="de-CH" dirty="0"/>
             </a:p>
           </p:txBody>
         </p:sp>
@@ -11214,10 +11019,9 @@
                 <a:p>
                   <a:pPr algn="ctr"/>
                   <a:r>
-                    <a:rPr lang="de-CH" dirty="0" smtClean="0"/>
+                    <a:rPr lang="de-CH" dirty="0"/>
                     <a:t>-10</a:t>
                   </a:r>
-                  <a:endParaRPr lang="de-CH" dirty="0"/>
                 </a:p>
               </p:txBody>
             </p:sp>
@@ -11246,10 +11050,9 @@
               <a:p>
                 <a:pPr algn="ctr"/>
                 <a:r>
-                  <a:rPr lang="de-CH" dirty="0" smtClean="0"/>
+                  <a:rPr lang="de-CH" dirty="0"/>
                   <a:t>Minus-Karten</a:t>
                 </a:r>
-                <a:endParaRPr lang="de-CH" dirty="0"/>
               </a:p>
             </p:txBody>
           </p:sp>
@@ -11388,10 +11191,9 @@
               <a:p>
                 <a:pPr algn="ctr"/>
                 <a:r>
-                  <a:rPr lang="de-CH" dirty="0" smtClean="0"/>
+                  <a:rPr lang="de-CH" dirty="0"/>
                   <a:t>Spezielle Karten</a:t>
                 </a:r>
-                <a:endParaRPr lang="de-CH" dirty="0"/>
               </a:p>
             </p:txBody>
           </p:sp>
@@ -11436,10 +11238,9 @@
             <a:p>
               <a:pPr algn="ctr"/>
               <a:r>
-                <a:rPr lang="de-CH" dirty="0" smtClean="0"/>
+                <a:rPr lang="de-CH" dirty="0"/>
                 <a:t>Zufallskarte</a:t>
               </a:r>
-              <a:endParaRPr lang="de-CH" dirty="0"/>
             </a:p>
           </p:txBody>
         </p:sp>
@@ -11489,13 +11290,6 @@
   <p:clrMapOvr>
     <a:masterClrMapping/>
   </p:clrMapOvr>
-  <p:timing>
-    <p:tnLst>
-      <p:par>
-        <p:cTn id="1" dur="indefinite" restart="never" nodeType="tmRoot"/>
-      </p:par>
-    </p:tnLst>
-  </p:timing>
 </p:sld>
 </file>
 
@@ -11532,10 +11326,9 @@
           <a:lstStyle/>
           <a:p>
             <a:r>
-              <a:rPr lang="de-CH" dirty="0" smtClean="0"/>
+              <a:rPr lang="de-CH" dirty="0"/>
               <a:t>Quellenangaben</a:t>
             </a:r>
-            <a:endParaRPr lang="de-CH" dirty="0"/>
           </a:p>
         </p:txBody>
       </p:sp>
@@ -11558,45 +11351,27 @@
               <a:rPr lang="de-CH" dirty="0">
                 <a:hlinkClick r:id="rId2"/>
               </a:rPr>
-              <a:t>https://</a:t>
-            </a:r>
-            <a:r>
-              <a:rPr lang="de-CH" dirty="0" smtClean="0">
-                <a:hlinkClick r:id="rId2"/>
-              </a:rPr>
-              <a:t>de.cleanpng.com/png-em45vq/download-png.html</a:t>
-            </a:r>
-            <a:endParaRPr lang="de-CH" dirty="0" smtClean="0"/>
+              <a:t>https://de.cleanpng.com/png-em45vq/download-png.html</a:t>
+            </a:r>
+            <a:endParaRPr lang="de-CH" dirty="0"/>
           </a:p>
           <a:p>
             <a:r>
               <a:rPr lang="de-CH" dirty="0">
                 <a:hlinkClick r:id="rId3"/>
               </a:rPr>
-              <a:t>https://</a:t>
-            </a:r>
-            <a:r>
-              <a:rPr lang="de-CH" dirty="0" smtClean="0">
-                <a:hlinkClick r:id="rId3"/>
-              </a:rPr>
-              <a:t>www.volgshop.ch/wp-content/uploads/2015/04/Red_Bull.jpg</a:t>
-            </a:r>
-            <a:endParaRPr lang="de-CH" dirty="0" smtClean="0"/>
+              <a:t>https://www.volgshop.ch/wp-content/uploads/2015/04/Red_Bull.jpg</a:t>
+            </a:r>
+            <a:endParaRPr lang="de-CH" dirty="0"/>
           </a:p>
           <a:p>
             <a:r>
               <a:rPr lang="de-CH" dirty="0">
                 <a:hlinkClick r:id="rId4"/>
               </a:rPr>
-              <a:t>https://</a:t>
-            </a:r>
-            <a:r>
-              <a:rPr lang="de-CH" dirty="0" smtClean="0">
-                <a:hlinkClick r:id="rId4"/>
-              </a:rPr>
-              <a:t>image.shutterstock.com/image-photo/playing-cards-hand-isolated-on-260nw-397538776.jpg</a:t>
-            </a:r>
-            <a:endParaRPr lang="de-CH" dirty="0" smtClean="0"/>
+              <a:t>https://image.shutterstock.com/image-photo/playing-cards-hand-isolated-on-260nw-397538776.jpg</a:t>
+            </a:r>
+            <a:endParaRPr lang="de-CH" dirty="0"/>
           </a:p>
           <a:p>
             <a:endParaRPr lang="de-CH" dirty="0"/>
@@ -11613,13 +11388,6 @@
   <p:clrMapOvr>
     <a:masterClrMapping/>
   </p:clrMapOvr>
-  <p:timing>
-    <p:tnLst>
-      <p:par>
-        <p:cTn id="1" dur="indefinite" restart="never" nodeType="tmRoot"/>
-      </p:par>
-    </p:tnLst>
-  </p:timing>
 </p:sld>
 </file>
 
@@ -12072,15 +11840,15 @@
                   <a:schemeClr val="tx1"/>
                 </a:solidFill>
               </a:rPr>
-              <a:t>Ziel dieses Spieles ist es 180 Kreditpunkte zu erzielen. In jeder Runde darf der Spieler </a:t>
-            </a:r>
-            <a:r>
-              <a:rPr lang="de-CH" sz="1400" dirty="0" smtClean="0">
-                <a:solidFill>
-                  <a:schemeClr val="tx1"/>
-                </a:solidFill>
-              </a:rPr>
-              <a:t>entscheiden </a:t>
+              <a:t>Ziel dieses Spieles ist es 180 Kreditpunkte zu erzielen. In jeder Runde darf der Spieler entscheiden ob er eine Karte ziehen, eine Karte wegschmeissen oder diese Runde aussetzen möchte. Hat ein Spieler über 180 Kreditpunkte erzielt, hat er verloren und bekommt 0 </a:t>
+            </a:r>
+            <a:r>
+              <a:rPr lang="de-CH" sz="1400" dirty="0" err="1">
+                <a:solidFill>
+                  <a:schemeClr val="tx1"/>
+                </a:solidFill>
+              </a:rPr>
+              <a:t>Coins</a:t>
             </a:r>
             <a:r>
               <a:rPr lang="de-CH" sz="1400" dirty="0">
@@ -12088,37 +11856,8 @@
                   <a:schemeClr val="tx1"/>
                 </a:solidFill>
               </a:rPr>
-              <a:t>ob er eine Karte ziehen, eine Karte wegschmeissen oder diese Runde aussetzen möchte. Hat ein Spieler über 180 Kreditpunkte erzielt, hat er verloren und </a:t>
-            </a:r>
-            <a:r>
-              <a:rPr lang="de-CH" sz="1400" dirty="0" smtClean="0">
-                <a:solidFill>
-                  <a:schemeClr val="tx1"/>
-                </a:solidFill>
-              </a:rPr>
-              <a:t>bekommt 0 </a:t>
-            </a:r>
-            <a:r>
-              <a:rPr lang="de-CH" sz="1400" dirty="0" err="1" smtClean="0">
-                <a:solidFill>
-                  <a:schemeClr val="tx1"/>
-                </a:solidFill>
-              </a:rPr>
-              <a:t>Coins</a:t>
-            </a:r>
-            <a:r>
-              <a:rPr lang="de-CH" sz="1400" dirty="0" smtClean="0">
-                <a:solidFill>
-                  <a:schemeClr val="tx1"/>
-                </a:solidFill>
-              </a:rPr>
               <a:t>. </a:t>
             </a:r>
-            <a:endParaRPr lang="de-CH" sz="1400" dirty="0">
-              <a:solidFill>
-                <a:schemeClr val="tx1"/>
-              </a:solidFill>
-            </a:endParaRPr>
           </a:p>
         </p:txBody>
       </p:sp>
@@ -12275,18 +12014,13 @@
           <a:p>
             <a:pPr algn="ctr"/>
             <a:r>
-              <a:rPr lang="de-CH" i="1" dirty="0" smtClean="0">
+              <a:rPr lang="de-CH" i="1" dirty="0">
                 <a:solidFill>
                   <a:schemeClr val="tx1"/>
                 </a:solidFill>
               </a:rPr>
               <a:t>Lobby</a:t>
             </a:r>
-            <a:endParaRPr lang="de-CH" i="1" dirty="0">
-              <a:solidFill>
-                <a:schemeClr val="tx1"/>
-              </a:solidFill>
-            </a:endParaRPr>
           </a:p>
         </p:txBody>
       </p:sp>
@@ -12848,7 +12582,7 @@
           <a:p>
             <a:pPr algn="ctr"/>
             <a:r>
-              <a:rPr lang="de-CH" i="1" smtClean="0">
+              <a:rPr lang="de-CH" i="1">
                 <a:solidFill>
                   <a:schemeClr val="tx1"/>
                 </a:solidFill>
@@ -13373,18 +13107,13 @@
           <a:p>
             <a:pPr algn="ctr"/>
             <a:r>
-              <a:rPr lang="de-CH" i="1" dirty="0" smtClean="0">
+              <a:rPr lang="de-CH" i="1" dirty="0">
                 <a:solidFill>
                   <a:schemeClr val="tx1"/>
                 </a:solidFill>
               </a:rPr>
               <a:t>Einloggen</a:t>
             </a:r>
-            <a:endParaRPr lang="de-CH" i="1" dirty="0">
-              <a:solidFill>
-                <a:schemeClr val="tx1"/>
-              </a:solidFill>
-            </a:endParaRPr>
           </a:p>
         </p:txBody>
       </p:sp>
@@ -13497,7 +13226,7 @@
             <a:lstStyle/>
             <a:p>
               <a:r>
-                <a:rPr lang="de-CH" dirty="0" smtClean="0">
+                <a:rPr lang="de-CH" dirty="0">
                   <a:solidFill>
                     <a:schemeClr val="tx1"/>
                   </a:solidFill>
@@ -13507,7 +13236,7 @@
             </a:p>
             <a:p>
               <a:r>
-                <a:rPr lang="de-CH" i="1" dirty="0" smtClean="0">
+                <a:rPr lang="de-CH" i="1" dirty="0">
                   <a:solidFill>
                     <a:schemeClr val="bg2">
                       <a:lumMod val="75000"/>
@@ -13516,13 +13245,6 @@
                 </a:rPr>
                 <a:t>Name eingeben</a:t>
               </a:r>
-              <a:endParaRPr lang="de-CH" i="1" dirty="0">
-                <a:solidFill>
-                  <a:schemeClr val="bg2">
-                    <a:lumMod val="75000"/>
-                  </a:schemeClr>
-                </a:solidFill>
-              </a:endParaRPr>
             </a:p>
           </p:txBody>
         </p:sp>
@@ -13570,18 +13292,13 @@
             <a:lstStyle/>
             <a:p>
               <a:r>
-                <a:rPr lang="de-CH" dirty="0" smtClean="0">
+                <a:rPr lang="de-CH" dirty="0">
                   <a:solidFill>
                     <a:schemeClr val="tx1"/>
                   </a:solidFill>
                 </a:rPr>
                 <a:t>Spielerlogo auswählen</a:t>
               </a:r>
-              <a:endParaRPr lang="de-CH" dirty="0">
-                <a:solidFill>
-                  <a:schemeClr val="tx1"/>
-                </a:solidFill>
-              </a:endParaRPr>
             </a:p>
           </p:txBody>
         </p:sp>
@@ -13628,7 +13345,7 @@
             <a:p>
               <a:pPr algn="ctr"/>
               <a:r>
-                <a:rPr lang="de-CH" sz="1600" b="1" dirty="0" err="1" smtClean="0">
+                <a:rPr lang="de-CH" sz="1600" b="1" dirty="0" err="1">
                   <a:solidFill>
                     <a:schemeClr val="tx1"/>
                   </a:solidFill>
@@ -13688,7 +13405,7 @@
             <a:p>
               <a:pPr algn="ctr"/>
               <a:r>
-                <a:rPr lang="de-CH" sz="1600" b="1" dirty="0" err="1" smtClean="0">
+                <a:rPr lang="de-CH" sz="1600" b="1" dirty="0" err="1">
                   <a:solidFill>
                     <a:schemeClr val="tx1"/>
                   </a:solidFill>
@@ -13746,18 +13463,13 @@
             <a:p>
               <a:pPr algn="ctr"/>
               <a:r>
-                <a:rPr lang="de-CH" sz="1600" b="1" dirty="0" smtClean="0">
+                <a:rPr lang="de-CH" sz="1600" b="1" dirty="0">
                   <a:solidFill>
                     <a:schemeClr val="tx1"/>
                   </a:solidFill>
                 </a:rPr>
                 <a:t>Punk</a:t>
               </a:r>
-              <a:endParaRPr lang="de-CH" sz="1600" b="1" dirty="0">
-                <a:solidFill>
-                  <a:schemeClr val="tx1"/>
-                </a:solidFill>
-              </a:endParaRPr>
             </a:p>
           </p:txBody>
         </p:sp>
@@ -13806,7 +13518,7 @@
             <a:p>
               <a:pPr algn="ctr"/>
               <a:r>
-                <a:rPr lang="de-CH" sz="1600" b="1" dirty="0" err="1" smtClean="0">
+                <a:rPr lang="de-CH" sz="1600" b="1" dirty="0" err="1">
                   <a:solidFill>
                     <a:schemeClr val="tx1"/>
                   </a:solidFill>
@@ -13832,13 +13544,6 @@
   <p:clrMapOvr>
     <a:masterClrMapping/>
   </p:clrMapOvr>
-  <p:timing>
-    <p:tnLst>
-      <p:par>
-        <p:cTn id="1" dur="indefinite" restart="never" nodeType="tmRoot"/>
-      </p:par>
-    </p:tnLst>
-  </p:timing>
 </p:sld>
 </file>
 
@@ -14261,18 +13966,13 @@
           <a:p>
             <a:pPr algn="ctr"/>
             <a:r>
-              <a:rPr lang="de-CH" i="1" dirty="0" smtClean="0">
+              <a:rPr lang="de-CH" i="1" dirty="0">
                 <a:solidFill>
                   <a:schemeClr val="tx1"/>
                 </a:solidFill>
               </a:rPr>
               <a:t>Einloggen</a:t>
             </a:r>
-            <a:endParaRPr lang="de-CH" i="1" dirty="0">
-              <a:solidFill>
-                <a:schemeClr val="tx1"/>
-              </a:solidFill>
-            </a:endParaRPr>
           </a:p>
         </p:txBody>
       </p:sp>
@@ -14385,7 +14085,7 @@
             <a:lstStyle/>
             <a:p>
               <a:r>
-                <a:rPr lang="de-CH" dirty="0" smtClean="0">
+                <a:rPr lang="de-CH" dirty="0">
                   <a:solidFill>
                     <a:schemeClr val="tx1"/>
                   </a:solidFill>
@@ -14400,21 +14100,8 @@
                     <a:schemeClr val="tx1"/>
                   </a:solidFill>
                 </a:rPr>
-                <a:t>Anna		</a:t>
+                <a:t>Anna		✓</a:t>
               </a:r>
-              <a:r>
-                <a:rPr lang="de-CH" dirty="0" smtClean="0">
-                  <a:solidFill>
-                    <a:schemeClr val="tx1"/>
-                  </a:solidFill>
-                </a:rPr>
-                <a:t>✓</a:t>
-              </a:r>
-              <a:endParaRPr lang="de-CH" dirty="0">
-                <a:solidFill>
-                  <a:schemeClr val="tx1"/>
-                </a:solidFill>
-              </a:endParaRPr>
             </a:p>
           </p:txBody>
         </p:sp>
@@ -14462,18 +14149,13 @@
             <a:lstStyle/>
             <a:p>
               <a:r>
-                <a:rPr lang="de-CH" dirty="0" smtClean="0">
+                <a:rPr lang="de-CH" dirty="0">
                   <a:solidFill>
                     <a:schemeClr val="tx1"/>
                   </a:solidFill>
                 </a:rPr>
                 <a:t>Spielerlogo auswählen</a:t>
               </a:r>
-              <a:endParaRPr lang="de-CH" dirty="0">
-                <a:solidFill>
-                  <a:schemeClr val="tx1"/>
-                </a:solidFill>
-              </a:endParaRPr>
             </a:p>
           </p:txBody>
         </p:sp>
@@ -14520,7 +14202,7 @@
             <a:p>
               <a:pPr algn="ctr"/>
               <a:r>
-                <a:rPr lang="de-CH" sz="1600" b="1" dirty="0" err="1" smtClean="0">
+                <a:rPr lang="de-CH" sz="1600" b="1" dirty="0" err="1">
                   <a:solidFill>
                     <a:schemeClr val="tx1"/>
                   </a:solidFill>
@@ -14582,7 +14264,7 @@
             <a:p>
               <a:pPr algn="ctr"/>
               <a:r>
-                <a:rPr lang="de-CH" sz="1600" b="1" dirty="0" err="1" smtClean="0">
+                <a:rPr lang="de-CH" sz="1600" b="1" dirty="0" err="1">
                   <a:solidFill>
                     <a:schemeClr val="tx1"/>
                   </a:solidFill>
@@ -14640,18 +14322,13 @@
             <a:p>
               <a:pPr algn="ctr"/>
               <a:r>
-                <a:rPr lang="de-CH" sz="1600" b="1" dirty="0" smtClean="0">
+                <a:rPr lang="de-CH" sz="1600" b="1" dirty="0">
                   <a:solidFill>
                     <a:schemeClr val="tx1"/>
                   </a:solidFill>
                 </a:rPr>
                 <a:t>Punk</a:t>
               </a:r>
-              <a:endParaRPr lang="de-CH" sz="1600" b="1" dirty="0">
-                <a:solidFill>
-                  <a:schemeClr val="tx1"/>
-                </a:solidFill>
-              </a:endParaRPr>
             </a:p>
           </p:txBody>
         </p:sp>
@@ -14700,7 +14377,7 @@
             <a:p>
               <a:pPr algn="ctr"/>
               <a:r>
-                <a:rPr lang="de-CH" sz="1600" b="1" dirty="0" err="1" smtClean="0">
+                <a:rPr lang="de-CH" sz="1600" b="1" dirty="0" err="1">
                   <a:solidFill>
                     <a:schemeClr val="tx1"/>
                   </a:solidFill>
@@ -14756,18 +14433,13 @@
           <a:p>
             <a:pPr algn="ctr"/>
             <a:r>
-              <a:rPr lang="de-CH" sz="1400" dirty="0" smtClean="0">
+              <a:rPr lang="de-CH" sz="1400" dirty="0">
                 <a:solidFill>
                   <a:srgbClr val="92D050"/>
                 </a:solidFill>
               </a:rPr>
               <a:t>Username ok!</a:t>
             </a:r>
-            <a:endParaRPr lang="de-CH" sz="1400" dirty="0">
-              <a:solidFill>
-                <a:srgbClr val="92D050"/>
-              </a:solidFill>
-            </a:endParaRPr>
           </a:p>
         </p:txBody>
       </p:sp>
@@ -14781,13 +14453,6 @@
   <p:clrMapOvr>
     <a:masterClrMapping/>
   </p:clrMapOvr>
-  <p:timing>
-    <p:tnLst>
-      <p:par>
-        <p:cTn id="1" dur="indefinite" restart="never" nodeType="tmRoot"/>
-      </p:par>
-    </p:tnLst>
-  </p:timing>
 </p:sld>
 </file>
 
@@ -15210,18 +14875,13 @@
           <a:p>
             <a:pPr algn="ctr"/>
             <a:r>
-              <a:rPr lang="de-CH" i="1" dirty="0" smtClean="0">
+              <a:rPr lang="de-CH" i="1" dirty="0">
                 <a:solidFill>
                   <a:schemeClr val="tx1"/>
                 </a:solidFill>
               </a:rPr>
               <a:t>Einloggen</a:t>
             </a:r>
-            <a:endParaRPr lang="de-CH" i="1" dirty="0">
-              <a:solidFill>
-                <a:schemeClr val="tx1"/>
-              </a:solidFill>
-            </a:endParaRPr>
           </a:p>
         </p:txBody>
       </p:sp>
@@ -15334,7 +14994,7 @@
             <a:lstStyle/>
             <a:p>
               <a:r>
-                <a:rPr lang="de-CH" dirty="0" smtClean="0">
+                <a:rPr lang="de-CH" dirty="0">
                   <a:solidFill>
                     <a:schemeClr val="tx1"/>
                   </a:solidFill>
@@ -15349,21 +15009,8 @@
                     <a:schemeClr val="tx1"/>
                   </a:solidFill>
                 </a:rPr>
-                <a:t>Anna		</a:t>
+                <a:t>Anna		✖</a:t>
               </a:r>
-              <a:r>
-                <a:rPr lang="de-CH" dirty="0" smtClean="0">
-                  <a:solidFill>
-                    <a:schemeClr val="tx1"/>
-                  </a:solidFill>
-                </a:rPr>
-                <a:t>✖</a:t>
-              </a:r>
-              <a:endParaRPr lang="de-CH" dirty="0">
-                <a:solidFill>
-                  <a:schemeClr val="tx1"/>
-                </a:solidFill>
-              </a:endParaRPr>
             </a:p>
           </p:txBody>
         </p:sp>
@@ -15411,18 +15058,13 @@
             <a:lstStyle/>
             <a:p>
               <a:r>
-                <a:rPr lang="de-CH" dirty="0" smtClean="0">
+                <a:rPr lang="de-CH" dirty="0">
                   <a:solidFill>
                     <a:schemeClr val="tx1"/>
                   </a:solidFill>
                 </a:rPr>
                 <a:t>Spielerlogo auswählen</a:t>
               </a:r>
-              <a:endParaRPr lang="de-CH" dirty="0">
-                <a:solidFill>
-                  <a:schemeClr val="tx1"/>
-                </a:solidFill>
-              </a:endParaRPr>
             </a:p>
           </p:txBody>
         </p:sp>
@@ -15469,7 +15111,7 @@
             <a:p>
               <a:pPr algn="ctr"/>
               <a:r>
-                <a:rPr lang="de-CH" sz="1600" b="1" dirty="0" err="1" smtClean="0">
+                <a:rPr lang="de-CH" sz="1600" b="1" dirty="0" err="1">
                   <a:solidFill>
                     <a:schemeClr val="tx1"/>
                   </a:solidFill>
@@ -15531,7 +15173,7 @@
             <a:p>
               <a:pPr algn="ctr"/>
               <a:r>
-                <a:rPr lang="de-CH" sz="1600" b="1" dirty="0" err="1" smtClean="0">
+                <a:rPr lang="de-CH" sz="1600" b="1" dirty="0" err="1">
                   <a:solidFill>
                     <a:schemeClr val="tx1"/>
                   </a:solidFill>
@@ -15589,18 +15231,13 @@
             <a:p>
               <a:pPr algn="ctr"/>
               <a:r>
-                <a:rPr lang="de-CH" sz="1600" b="1" dirty="0" smtClean="0">
+                <a:rPr lang="de-CH" sz="1600" b="1" dirty="0">
                   <a:solidFill>
                     <a:schemeClr val="tx1"/>
                   </a:solidFill>
                 </a:rPr>
                 <a:t>Punk</a:t>
               </a:r>
-              <a:endParaRPr lang="de-CH" sz="1600" b="1" dirty="0">
-                <a:solidFill>
-                  <a:schemeClr val="tx1"/>
-                </a:solidFill>
-              </a:endParaRPr>
             </a:p>
           </p:txBody>
         </p:sp>
@@ -15649,7 +15286,7 @@
             <a:p>
               <a:pPr algn="ctr"/>
               <a:r>
-                <a:rPr lang="de-CH" sz="1600" b="1" dirty="0" err="1" smtClean="0">
+                <a:rPr lang="de-CH" sz="1600" b="1" dirty="0" err="1">
                   <a:solidFill>
                     <a:schemeClr val="tx1"/>
                   </a:solidFill>
@@ -15705,18 +15342,13 @@
           <a:p>
             <a:pPr algn="ctr"/>
             <a:r>
-              <a:rPr lang="de-CH" sz="1400" dirty="0" smtClean="0">
+              <a:rPr lang="de-CH" sz="1400" dirty="0">
                 <a:solidFill>
                   <a:srgbClr val="FF0000"/>
                 </a:solidFill>
               </a:rPr>
               <a:t>Username schon benutzt!</a:t>
             </a:r>
-            <a:endParaRPr lang="de-CH" sz="1400" dirty="0">
-              <a:solidFill>
-                <a:srgbClr val="FF0000"/>
-              </a:solidFill>
-            </a:endParaRPr>
           </a:p>
         </p:txBody>
       </p:sp>
@@ -15730,13 +15362,6 @@
   <p:clrMapOvr>
     <a:masterClrMapping/>
   </p:clrMapOvr>
-  <p:timing>
-    <p:tnLst>
-      <p:par>
-        <p:cTn id="1" dur="indefinite" restart="never" nodeType="tmRoot"/>
-      </p:par>
-    </p:tnLst>
-  </p:timing>
 </p:sld>
 </file>
 
@@ -16029,15 +15654,25 @@
                   <a:schemeClr val="tx1"/>
                 </a:solidFill>
               </a:rPr>
-              <a:t>Momentaner Stand der </a:t>
-            </a:r>
+              <a:t>Momentaner Stand der Konten</a:t>
+            </a:r>
+          </a:p>
+          <a:p>
             <a:r>
               <a:rPr lang="de-CH" sz="1600" dirty="0">
                 <a:solidFill>
                   <a:schemeClr val="tx1"/>
                 </a:solidFill>
               </a:rPr>
-              <a:t>Konten</a:t>
+              <a:t>Anna: 	0 </a:t>
+            </a:r>
+            <a:r>
+              <a:rPr lang="de-CH" sz="1600" dirty="0" err="1">
+                <a:solidFill>
+                  <a:schemeClr val="tx1"/>
+                </a:solidFill>
+              </a:rPr>
+              <a:t>Coins</a:t>
             </a:r>
             <a:endParaRPr lang="de-CH" sz="1600" dirty="0">
               <a:solidFill>
@@ -16052,18 +15687,10 @@
                   <a:schemeClr val="tx1"/>
                 </a:solidFill>
               </a:rPr>
-              <a:t>Anna: 	</a:t>
-            </a:r>
-            <a:r>
-              <a:rPr lang="de-CH" sz="1600" dirty="0" smtClean="0">
-                <a:solidFill>
-                  <a:schemeClr val="tx1"/>
-                </a:solidFill>
-              </a:rPr>
-              <a:t>0 </a:t>
-            </a:r>
-            <a:r>
-              <a:rPr lang="de-CH" sz="1600" dirty="0" err="1" smtClean="0">
+              <a:t>Mei:	0 </a:t>
+            </a:r>
+            <a:r>
+              <a:rPr lang="de-CH" sz="1600" dirty="0" err="1">
                 <a:solidFill>
                   <a:schemeClr val="tx1"/>
                 </a:solidFill>
@@ -16083,18 +15710,10 @@
                   <a:schemeClr val="tx1"/>
                 </a:solidFill>
               </a:rPr>
-              <a:t>Mei:	</a:t>
-            </a:r>
-            <a:r>
-              <a:rPr lang="de-CH" sz="1600" dirty="0" smtClean="0">
-                <a:solidFill>
-                  <a:schemeClr val="tx1"/>
-                </a:solidFill>
-              </a:rPr>
-              <a:t>0 </a:t>
-            </a:r>
-            <a:r>
-              <a:rPr lang="de-CH" sz="1600" dirty="0" err="1" smtClean="0">
+              <a:t>Adrian:	0 </a:t>
+            </a:r>
+            <a:r>
+              <a:rPr lang="de-CH" sz="1600" dirty="0" err="1">
                 <a:solidFill>
                   <a:schemeClr val="tx1"/>
                 </a:solidFill>
@@ -16114,49 +15733,10 @@
                   <a:schemeClr val="tx1"/>
                 </a:solidFill>
               </a:rPr>
-              <a:t>Adrian:	</a:t>
-            </a:r>
-            <a:r>
-              <a:rPr lang="de-CH" sz="1600" dirty="0" smtClean="0">
-                <a:solidFill>
-                  <a:schemeClr val="tx1"/>
-                </a:solidFill>
-              </a:rPr>
-              <a:t>0 </a:t>
-            </a:r>
-            <a:r>
-              <a:rPr lang="de-CH" sz="1600" dirty="0" err="1" smtClean="0">
-                <a:solidFill>
-                  <a:schemeClr val="tx1"/>
-                </a:solidFill>
-              </a:rPr>
-              <a:t>Coins</a:t>
-            </a:r>
-            <a:endParaRPr lang="de-CH" sz="1600" dirty="0">
-              <a:solidFill>
-                <a:schemeClr val="tx1"/>
-              </a:solidFill>
-            </a:endParaRPr>
-          </a:p>
-          <a:p>
-            <a:r>
-              <a:rPr lang="de-CH" sz="1600" dirty="0">
-                <a:solidFill>
-                  <a:schemeClr val="tx1"/>
-                </a:solidFill>
-              </a:rPr>
-              <a:t>Johannes:	</a:t>
-            </a:r>
-            <a:r>
-              <a:rPr lang="de-CH" sz="1600" dirty="0" smtClean="0">
-                <a:solidFill>
-                  <a:schemeClr val="tx1"/>
-                </a:solidFill>
-              </a:rPr>
-              <a:t>0 </a:t>
-            </a:r>
-            <a:r>
-              <a:rPr lang="de-CH" sz="1600" dirty="0" err="1" smtClean="0">
+              <a:t>Johannes:	0 </a:t>
+            </a:r>
+            <a:r>
+              <a:rPr lang="de-CH" sz="1600" dirty="0" err="1">
                 <a:solidFill>
                   <a:schemeClr val="tx1"/>
                 </a:solidFill>
@@ -16462,18 +16042,13 @@
           <a:p>
             <a:pPr algn="ctr"/>
             <a:r>
-              <a:rPr lang="de-CH" i="1" dirty="0" smtClean="0">
+              <a:rPr lang="de-CH" i="1" dirty="0">
                 <a:solidFill>
                   <a:schemeClr val="tx1"/>
                 </a:solidFill>
               </a:rPr>
               <a:t>Anfangszustand</a:t>
             </a:r>
-            <a:endParaRPr lang="de-CH" i="1" dirty="0">
-              <a:solidFill>
-                <a:schemeClr val="tx1"/>
-              </a:solidFill>
-            </a:endParaRPr>
           </a:p>
         </p:txBody>
       </p:sp>
@@ -16487,13 +16062,6 @@
   <p:clrMapOvr>
     <a:masterClrMapping/>
   </p:clrMapOvr>
-  <p:timing>
-    <p:tnLst>
-      <p:par>
-        <p:cTn id="1" dur="indefinite" restart="never" nodeType="tmRoot"/>
-      </p:par>
-    </p:tnLst>
-  </p:timing>
 </p:sld>
 </file>
 
@@ -18081,18 +17649,13 @@
           <a:p>
             <a:pPr algn="ctr"/>
             <a:r>
-              <a:rPr lang="de-CH" i="1" dirty="0" smtClean="0">
+              <a:rPr lang="de-CH" i="1" dirty="0">
                 <a:solidFill>
                   <a:schemeClr val="tx1"/>
                 </a:solidFill>
               </a:rPr>
               <a:t>Nach ein paar Runden</a:t>
             </a:r>
-            <a:endParaRPr lang="de-CH" i="1" dirty="0">
-              <a:solidFill>
-                <a:schemeClr val="tx1"/>
-              </a:solidFill>
-            </a:endParaRPr>
           </a:p>
         </p:txBody>
       </p:sp>
@@ -18106,13 +17669,6 @@
   <p:clrMapOvr>
     <a:masterClrMapping/>
   </p:clrMapOvr>
-  <p:timing>
-    <p:tnLst>
-      <p:par>
-        <p:cTn id="1" dur="indefinite" restart="never" nodeType="tmRoot"/>
-      </p:par>
-    </p:tnLst>
-  </p:timing>
 </p:sld>
 </file>
 
@@ -19705,18 +19261,13 @@
           <a:p>
             <a:pPr algn="ctr"/>
             <a:r>
-              <a:rPr lang="de-CH" i="1" dirty="0" smtClean="0">
+              <a:rPr lang="de-CH" i="1" dirty="0">
                 <a:solidFill>
                   <a:schemeClr val="tx1"/>
                 </a:solidFill>
               </a:rPr>
               <a:t>Chatten</a:t>
             </a:r>
-            <a:endParaRPr lang="de-CH" i="1" dirty="0">
-              <a:solidFill>
-                <a:schemeClr val="tx1"/>
-              </a:solidFill>
-            </a:endParaRPr>
           </a:p>
         </p:txBody>
       </p:sp>
@@ -19730,13 +19281,6 @@
   <p:clrMapOvr>
     <a:masterClrMapping/>
   </p:clrMapOvr>
-  <p:timing>
-    <p:tnLst>
-      <p:par>
-        <p:cTn id="1" dur="indefinite" restart="never" nodeType="tmRoot"/>
-      </p:par>
-    </p:tnLst>
-  </p:timing>
 </p:sld>
 </file>
 

</xml_diff>